<commit_message>
Remove bug story slide from defense presentations (13 → 12 slides)
The _normalize() parse failure bug was an internal implementation detail,
not suitable for thesis defense. Removed slide 6 (bug story) and 5th key
finding from both PPTX and HTML generators. Renumbered remaining slides.
</commit_message>
<xml_diff>
--- a/defense_presentation.pptx
+++ b/defense_presentation.pptx
@@ -17,10 +17,9 @@
     <p:sldId id="265" r:id="rId11"/>
     <p:sldId id="266" r:id="rId12"/>
     <p:sldId id="267" r:id="rId13"/>
-    <p:sldId id="268" r:id="rId14"/>
   </p:sldIdLst>
   <p:notesMasterIdLst>
-    <p:notesMasterId r:id="rId15"/>
+    <p:notesMasterId r:id="rId14"/>
   </p:notesMasterIdLst>
   <p:sldSz cx="9144000" cy="5143500"/>
   <p:notesSz cx="5143500" cy="9144000"/>
@@ -820,94 +819,6 @@
 </p:notes>
 </file>
 
-<file path=ppt/notesSlides/notesSlide13.xml><?xml version="1.0" encoding="utf-8"?>
-<p:notes xmlns:a="http://schemas.openxmlformats.org/drawingml/2006/main" xmlns:r="http://schemas.openxmlformats.org/officeDocument/2006/relationships" xmlns:p="http://schemas.openxmlformats.org/presentationml/2006/main">
-  <p:cSld>
-    <p:spTree>
-      <p:nvGrpSpPr>
-        <p:cNvPr id="1" name=""/>
-        <p:cNvGrpSpPr/>
-        <p:nvPr/>
-      </p:nvGrpSpPr>
-      <p:grpSpPr>
-        <a:xfrm>
-          <a:off x="0" y="0"/>
-          <a:ext cx="0" cy="0"/>
-          <a:chOff x="0" y="0"/>
-          <a:chExt cx="0" cy="0"/>
-        </a:xfrm>
-      </p:grpSpPr>
-      <p:sp>
-        <p:nvSpPr>
-          <p:cNvPr id="2" name="Slide Image Placeholder 1"/>
-          <p:cNvSpPr>
-            <a:spLocks noGrp="1" noRot="1" noChangeAspect="1"/>
-          </p:cNvSpPr>
-          <p:nvPr>
-            <p:ph type="sldImg"/>
-          </p:nvPr>
-        </p:nvSpPr>
-        <p:spPr/>
-      </p:sp>
-      <p:sp>
-        <p:nvSpPr>
-          <p:cNvPr id="3" name="Notes Placeholder 2"/>
-          <p:cNvSpPr>
-            <a:spLocks noGrp="1"/>
-          </p:cNvSpPr>
-          <p:nvPr>
-            <p:ph type="body" idx="1"/>
-          </p:nvPr>
-        </p:nvSpPr>
-        <p:spPr/>
-        <p:txBody>
-          <a:bodyPr/>
-          <a:lstStyle/>
-          <a:p>
-            <a:r>
-              <a:rPr lang="en-US" dirty="0"/>
-              <a:t/>
-            </a:r>
-            <a:endParaRPr lang="en-US" dirty="0"/>
-          </a:p>
-        </p:txBody>
-      </p:sp>
-      <p:sp>
-        <p:nvSpPr>
-          <p:cNvPr id="4" name="Slide Number Placeholder 3"/>
-          <p:cNvSpPr>
-            <a:spLocks noGrp="1"/>
-          </p:cNvSpPr>
-          <p:nvPr>
-            <p:ph type="sldNum" sz="quarter" idx="10"/>
-          </p:nvPr>
-        </p:nvSpPr>
-        <p:spPr/>
-        <p:txBody>
-          <a:bodyPr/>
-          <a:lstStyle/>
-          <a:p>
-            <a:fld id="{F7021451-1387-4CA6-816F-3879F97B5CBC}" type="slidenum">
-              <a:rPr lang="en-US"/>
-              <a:t>13</a:t>
-            </a:fld>
-            <a:endParaRPr lang="en-US"/>
-          </a:p>
-        </p:txBody>
-      </p:sp>
-    </p:spTree>
-    <p:extLst>
-      <p:ext uri="{BB962C8B-B14F-4D97-AF65-F5344CB8AC3E}">
-        <p14:creationId xmlns:p14="http://schemas.microsoft.com/office/powerpoint/2010/main" val="1024086991"/>
-      </p:ext>
-    </p:extLst>
-  </p:cSld>
-  <p:clrMapOvr>
-    <a:masterClrMapping/>
-  </p:clrMapOvr>
-</p:notes>
-</file>
-
 <file path=ppt/notesSlides/notesSlide2.xml><?xml version="1.0" encoding="utf-8"?>
 <p:notes xmlns:a="http://schemas.openxmlformats.org/drawingml/2006/main" xmlns:r="http://schemas.openxmlformats.org/officeDocument/2006/relationships" xmlns:p="http://schemas.openxmlformats.org/presentationml/2006/main">
   <p:cSld>
@@ -2250,7 +2161,7 @@
                 <a:ea typeface="Georgia" pitchFamily="34" charset="-122"/>
                 <a:cs typeface="Georgia" pitchFamily="34" charset="-120"/>
               </a:rPr>
-              <a:t>Цена срещу представяне</a:t>
+              <a:t>Мащаб срещу техника</a:t>
             </a:r>
             <a:endParaRPr lang="en-US" sz="2600" dirty="0"/>
           </a:p>
@@ -2271,8 +2182,8 @@
         </p:blipFill>
         <p:spPr>
           <a:xfrm>
-            <a:off x="365760" y="1005840"/>
-            <a:ext cx="7772400" cy="5029200"/>
+            <a:off x="365760" y="1097280"/>
+            <a:ext cx="6858000" cy="4754880"/>
           </a:xfrm>
           <a:prstGeom prst="rect">
             <a:avLst/>
@@ -2287,8 +2198,8 @@
         </p:nvSpPr>
         <p:spPr>
           <a:xfrm>
-            <a:off x="8503920" y="1188720"/>
-            <a:ext cx="3108960" cy="1188720"/>
+            <a:off x="7589520" y="1280160"/>
+            <a:ext cx="3931920" cy="1188720"/>
           </a:xfrm>
           <a:prstGeom prst="rect">
             <a:avLst>
@@ -2316,8 +2227,8 @@
         </p:nvSpPr>
         <p:spPr>
           <a:xfrm>
-            <a:off x="8503920" y="1188720"/>
-            <a:ext cx="3108960" cy="54864"/>
+            <a:off x="7589520" y="1280160"/>
+            <a:ext cx="3931920" cy="54864"/>
           </a:xfrm>
           <a:prstGeom prst="rect">
             <a:avLst/>
@@ -2336,8 +2247,8 @@
         </p:nvSpPr>
         <p:spPr>
           <a:xfrm>
-            <a:off x="8503920" y="1325880"/>
-            <a:ext cx="3108960" cy="594360"/>
+            <a:off x="7589520" y="1417320"/>
+            <a:ext cx="3931920" cy="594360"/>
           </a:xfrm>
           <a:prstGeom prst="rect">
             <a:avLst/>
@@ -2361,7 +2272,7 @@
                 <a:ea typeface="Consolas" pitchFamily="34" charset="-122"/>
                 <a:cs typeface="Consolas" pitchFamily="34" charset="-120"/>
               </a:rPr>
-              <a:t>$0</a:t>
+              <a:t>+0.058</a:t>
             </a:r>
             <a:endParaRPr lang="en-US" sz="3600" dirty="0"/>
           </a:p>
@@ -2375,8 +2286,8 @@
         </p:nvSpPr>
         <p:spPr>
           <a:xfrm>
-            <a:off x="8595360" y="1783080"/>
-            <a:ext cx="2926080" cy="475488"/>
+            <a:off x="7680960" y="1874520"/>
+            <a:ext cx="3749040" cy="475488"/>
           </a:xfrm>
           <a:prstGeom prst="rect">
             <a:avLst/>
@@ -2400,7 +2311,7 @@
                 <a:ea typeface="Calibri" pitchFamily="34" charset="-122"/>
                 <a:cs typeface="Calibri" pitchFamily="34" charset="-120"/>
               </a:rPr>
-              <a:t>Classic ML</a:t>
+              <a:t>Thinking ефект при 671B</a:t>
             </a:r>
             <a:endParaRPr lang="en-US" sz="1300" dirty="0"/>
           </a:p>
@@ -2417,7 +2328,7 @@
                 <a:ea typeface="Calibri" pitchFamily="34" charset="-122"/>
                 <a:cs typeface="Calibri" pitchFamily="34" charset="-120"/>
               </a:rPr>
-              <a:t>(най-висок F1)</a:t>
+              <a:t>(DeepSeek V3.2 parent)</a:t>
             </a:r>
             <a:endParaRPr lang="en-US" sz="1300" dirty="0"/>
           </a:p>
@@ -2431,8 +2342,8 @@
         </p:nvSpPr>
         <p:spPr>
           <a:xfrm>
-            <a:off x="8503920" y="2651760"/>
-            <a:ext cx="3108960" cy="1188720"/>
+            <a:off x="7589520" y="2743200"/>
+            <a:ext cx="3931920" cy="1188720"/>
           </a:xfrm>
           <a:prstGeom prst="rect">
             <a:avLst>
@@ -2460,14 +2371,14 @@
         </p:nvSpPr>
         <p:spPr>
           <a:xfrm>
-            <a:off x="8503920" y="2651760"/>
-            <a:ext cx="3108960" cy="54864"/>
-          </a:xfrm>
-          <a:prstGeom prst="rect">
-            <a:avLst/>
-          </a:prstGeom>
-          <a:solidFill>
-            <a:srgbClr val="5FA8D3"/>
+            <a:off x="7589520" y="2743200"/>
+            <a:ext cx="3931920" cy="54864"/>
+          </a:xfrm>
+          <a:prstGeom prst="rect">
+            <a:avLst/>
+          </a:prstGeom>
+          <a:solidFill>
+            <a:srgbClr val="FF7F0E"/>
           </a:solidFill>
           <a:ln/>
         </p:spPr>
@@ -2480,8 +2391,8 @@
         </p:nvSpPr>
         <p:spPr>
           <a:xfrm>
-            <a:off x="8503920" y="2788920"/>
-            <a:ext cx="3108960" cy="594360"/>
+            <a:off x="7589520" y="2880360"/>
+            <a:ext cx="3931920" cy="594360"/>
           </a:xfrm>
           <a:prstGeom prst="rect">
             <a:avLst/>
@@ -2499,13 +2410,13 @@
             <a:r>
               <a:rPr lang="en-US" sz="3600" b="1" dirty="0">
                 <a:solidFill>
-                  <a:srgbClr val="5FA8D3"/>
+                  <a:srgbClr val="FF7F0E"/>
                 </a:solidFill>
                 <a:latin typeface="Consolas" pitchFamily="34" charset="0"/>
                 <a:ea typeface="Consolas" pitchFamily="34" charset="-122"/>
                 <a:cs typeface="Consolas" pitchFamily="34" charset="-120"/>
               </a:rPr>
-              <a:t>$6.73</a:t>
+              <a:t>+0.007</a:t>
             </a:r>
             <a:endParaRPr lang="en-US" sz="3600" dirty="0"/>
           </a:p>
@@ -2519,8 +2430,8 @@
         </p:nvSpPr>
         <p:spPr>
           <a:xfrm>
-            <a:off x="8595360" y="3246120"/>
-            <a:ext cx="2926080" cy="475488"/>
+            <a:off x="7680960" y="3337560"/>
+            <a:ext cx="3749040" cy="475488"/>
           </a:xfrm>
           <a:prstGeom prst="rect">
             <a:avLst/>
@@ -2544,7 +2455,7 @@
                 <a:ea typeface="Calibri" pitchFamily="34" charset="-122"/>
                 <a:cs typeface="Calibri" pitchFamily="34" charset="-120"/>
               </a:rPr>
-              <a:t>DeepSeek V3.2</a:t>
+              <a:t>Thinking ефект при 8B</a:t>
             </a:r>
             <a:endParaRPr lang="en-US" sz="1300" dirty="0"/>
           </a:p>
@@ -2561,7 +2472,7 @@
                 <a:ea typeface="Calibri" pitchFamily="34" charset="-122"/>
                 <a:cs typeface="Calibri" pitchFamily="34" charset="-120"/>
               </a:rPr>
-              <a:t>+ Thinking</a:t>
+              <a:t>(Qwen3-8B FS taxonomy)</a:t>
             </a:r>
             <a:endParaRPr lang="en-US" sz="1300" dirty="0"/>
           </a:p>
@@ -2575,8 +2486,8 @@
         </p:nvSpPr>
         <p:spPr>
           <a:xfrm>
-            <a:off x="8503920" y="4114800"/>
-            <a:ext cx="3108960" cy="1188720"/>
+            <a:off x="7589520" y="4206240"/>
+            <a:ext cx="3931920" cy="1188720"/>
           </a:xfrm>
           <a:prstGeom prst="rect">
             <a:avLst>
@@ -2604,8 +2515,8 @@
         </p:nvSpPr>
         <p:spPr>
           <a:xfrm>
-            <a:off x="8503920" y="4114800"/>
-            <a:ext cx="3108960" cy="54864"/>
+            <a:off x="7589520" y="4206240"/>
+            <a:ext cx="3931920" cy="54864"/>
           </a:xfrm>
           <a:prstGeom prst="rect">
             <a:avLst/>
@@ -2624,8 +2535,8 @@
         </p:nvSpPr>
         <p:spPr>
           <a:xfrm>
-            <a:off x="8503920" y="4251960"/>
-            <a:ext cx="3108960" cy="594360"/>
+            <a:off x="7589520" y="4343400"/>
+            <a:ext cx="3931920" cy="594360"/>
           </a:xfrm>
           <a:prstGeom prst="rect">
             <a:avLst/>
@@ -2649,7 +2560,7 @@
                 <a:ea typeface="Consolas" pitchFamily="34" charset="-122"/>
                 <a:cs typeface="Consolas" pitchFamily="34" charset="-120"/>
               </a:rPr>
-              <a:t>~$19</a:t>
+              <a:t>−0.003</a:t>
             </a:r>
             <a:endParaRPr lang="en-US" sz="3600" dirty="0"/>
           </a:p>
@@ -2663,8 +2574,8 @@
         </p:nvSpPr>
         <p:spPr>
           <a:xfrm>
-            <a:off x="8595360" y="4709160"/>
-            <a:ext cx="2926080" cy="475488"/>
+            <a:off x="7680960" y="4800600"/>
+            <a:ext cx="3749040" cy="475488"/>
           </a:xfrm>
           <a:prstGeom prst="rect">
             <a:avLst/>
@@ -2688,7 +2599,7 @@
                 <a:ea typeface="Calibri" pitchFamily="34" charset="-122"/>
                 <a:cs typeface="Calibri" pitchFamily="34" charset="-120"/>
               </a:rPr>
-              <a:t>Qwen3-8B</a:t>
+              <a:t>Thinking при 48 лейбъла</a:t>
             </a:r>
             <a:endParaRPr lang="en-US" sz="1300" dirty="0"/>
           </a:p>
@@ -2705,7 +2616,7 @@
                 <a:ea typeface="Calibri" pitchFamily="34" charset="-122"/>
                 <a:cs typeface="Calibri" pitchFamily="34" charset="-120"/>
               </a:rPr>
-              <a:t>(всички опити)</a:t>
+              <a:t>(DeepSeek subcategory)</a:t>
             </a:r>
             <a:endParaRPr lang="en-US" sz="1300" dirty="0"/>
           </a:p>
@@ -2744,7 +2655,7 @@
                 <a:ea typeface="Calibri" pitchFamily="34" charset="-122"/>
                 <a:cs typeface="Calibri" pitchFamily="34" charset="-120"/>
               </a:rPr>
-              <a:t>Classic ML е едновременно най-евтин и най-точен за 13-лейбъл задачата</a:t>
+              <a:t>Thinking mode работи при 671B за прости задачи, но вреди при сложни (48 лейбъла, 21.6% parse failures)</a:t>
             </a:r>
             <a:endParaRPr lang="en-US" sz="1200" dirty="0"/>
           </a:p>
@@ -2783,7 +2694,7 @@
                 <a:ea typeface="Calibri" pitchFamily="34" charset="-122"/>
                 <a:cs typeface="Calibri" pitchFamily="34" charset="-120"/>
               </a:rPr>
-              <a:t>10 / 13</a:t>
+              <a:t>10 / 12</a:t>
             </a:r>
             <a:endParaRPr lang="en-US" sz="1000" dirty="0"/>
           </a:p>
@@ -2874,49 +2785,26 @@
                 <a:ea typeface="Georgia" pitchFamily="34" charset="-122"/>
                 <a:cs typeface="Georgia" pitchFamily="34" charset="-120"/>
               </a:rPr>
-              <a:t>Мащаб срещу техника</a:t>
+              <a:t>Ключови находки</a:t>
             </a:r>
             <a:endParaRPr lang="en-US" sz="2600" dirty="0"/>
           </a:p>
         </p:txBody>
       </p:sp>
-      <p:pic>
-        <p:nvPicPr>
-          <p:cNvPr id="4" name="Image 0" descr="preencoded.png">    </p:cNvPr>
-          <p:cNvPicPr>
-            <a:picLocks noChangeAspect="1"/>
-          </p:cNvPicPr>
-          <p:nvPr/>
-        </p:nvPicPr>
-        <p:blipFill>
-          <a:blip r:embed="rId1"/>
-          <a:srcRect l="0" r="0" t="0" b="0"/>
-          <a:stretch/>
-        </p:blipFill>
-        <p:spPr>
-          <a:xfrm>
-            <a:off x="365760" y="1097280"/>
-            <a:ext cx="6858000" cy="4754880"/>
-          </a:xfrm>
-          <a:prstGeom prst="rect">
-            <a:avLst/>
-          </a:prstGeom>
-        </p:spPr>
-      </p:pic>
-      <p:sp>
-        <p:nvSpPr>
-          <p:cNvPr id="5" name="Shape 2"/>
-          <p:cNvSpPr/>
-          <p:nvPr/>
-        </p:nvSpPr>
-        <p:spPr>
-          <a:xfrm>
-            <a:off x="7589520" y="1280160"/>
-            <a:ext cx="3931920" cy="1188720"/>
+      <p:sp>
+        <p:nvSpPr>
+          <p:cNvPr id="4" name="Shape 2"/>
+          <p:cNvSpPr/>
+          <p:nvPr/>
+        </p:nvSpPr>
+        <p:spPr>
+          <a:xfrm>
+            <a:off x="548640" y="1097280"/>
+            <a:ext cx="11094415" cy="868680"/>
           </a:xfrm>
           <a:prstGeom prst="rect">
             <a:avLst>
-              <a:gd name="adj" fmla="val 7692"/>
+              <a:gd name="adj" fmla="val 8421"/>
             </a:avLst>
           </a:prstGeom>
           <a:solidFill>
@@ -2934,14 +2822,14 @@
       </p:sp>
       <p:sp>
         <p:nvSpPr>
-          <p:cNvPr id="6" name="Shape 3"/>
-          <p:cNvSpPr/>
-          <p:nvPr/>
-        </p:nvSpPr>
-        <p:spPr>
-          <a:xfrm>
-            <a:off x="7589520" y="1280160"/>
-            <a:ext cx="3931920" cy="54864"/>
+          <p:cNvPr id="5" name="Shape 3"/>
+          <p:cNvSpPr/>
+          <p:nvPr/>
+        </p:nvSpPr>
+        <p:spPr>
+          <a:xfrm>
+            <a:off x="548640" y="1097280"/>
+            <a:ext cx="54864" cy="868680"/>
           </a:xfrm>
           <a:prstGeom prst="rect">
             <a:avLst/>
@@ -2954,53 +2842,53 @@
       </p:sp>
       <p:sp>
         <p:nvSpPr>
-          <p:cNvPr id="7" name="Text 4"/>
-          <p:cNvSpPr/>
-          <p:nvPr/>
-        </p:nvSpPr>
-        <p:spPr>
-          <a:xfrm>
-            <a:off x="7589520" y="1417320"/>
-            <a:ext cx="3931920" cy="594360"/>
-          </a:xfrm>
-          <a:prstGeom prst="rect">
-            <a:avLst/>
-          </a:prstGeom>
-          <a:noFill/>
-          <a:ln/>
-        </p:spPr>
-        <p:txBody>
-          <a:bodyPr wrap="square" rtlCol="0" anchor="ctr"/>
-          <a:lstStyle/>
-          <a:p>
-            <a:pPr algn="ctr" indent="0" marL="0">
-              <a:buNone/>
-            </a:pPr>
-            <a:r>
-              <a:rPr lang="en-US" sz="3600" b="1" dirty="0">
+          <p:cNvPr id="6" name="Text 4"/>
+          <p:cNvSpPr/>
+          <p:nvPr/>
+        </p:nvSpPr>
+        <p:spPr>
+          <a:xfrm>
+            <a:off x="777240" y="1143000"/>
+            <a:ext cx="3200400" cy="320040"/>
+          </a:xfrm>
+          <a:prstGeom prst="rect">
+            <a:avLst/>
+          </a:prstGeom>
+          <a:noFill/>
+          <a:ln/>
+        </p:spPr>
+        <p:txBody>
+          <a:bodyPr wrap="square" rtlCol="0" anchor="ctr"/>
+          <a:lstStyle/>
+          <a:p>
+            <a:pPr indent="0" marL="0">
+              <a:buNone/>
+            </a:pPr>
+            <a:r>
+              <a:rPr lang="en-US" sz="1400" b="1" dirty="0">
                 <a:solidFill>
                   <a:srgbClr val="2CA02C"/>
                 </a:solidFill>
-                <a:latin typeface="Consolas" pitchFamily="34" charset="0"/>
-                <a:ea typeface="Consolas" pitchFamily="34" charset="-122"/>
-                <a:cs typeface="Consolas" pitchFamily="34" charset="-120"/>
-              </a:rPr>
-              <a:t>+0.058</a:t>
-            </a:r>
-            <a:endParaRPr lang="en-US" sz="3600" dirty="0"/>
-          </a:p>
-        </p:txBody>
-      </p:sp>
-      <p:sp>
-        <p:nvSpPr>
-          <p:cNvPr id="8" name="Text 5"/>
-          <p:cNvSpPr/>
-          <p:nvPr/>
-        </p:nvSpPr>
-        <p:spPr>
-          <a:xfrm>
-            <a:off x="7680960" y="1874520"/>
-            <a:ext cx="3749040" cy="475488"/>
+                <a:latin typeface="Georgia" pitchFamily="34" charset="0"/>
+                <a:ea typeface="Georgia" pitchFamily="34" charset="-122"/>
+                <a:cs typeface="Georgia" pitchFamily="34" charset="-120"/>
+              </a:rPr>
+              <a:t>Classic ML доминира</a:t>
+            </a:r>
+            <a:endParaRPr lang="en-US" sz="1400" dirty="0"/>
+          </a:p>
+        </p:txBody>
+      </p:sp>
+      <p:sp>
+        <p:nvSpPr>
+          <p:cNvPr id="7" name="Text 5"/>
+          <p:cNvSpPr/>
+          <p:nvPr/>
+        </p:nvSpPr>
+        <p:spPr>
+          <a:xfrm>
+            <a:off x="777240" y="1417320"/>
+            <a:ext cx="10637215" cy="502920"/>
           </a:xfrm>
           <a:prstGeom prst="rect">
             <a:avLst/>
@@ -3012,55 +2900,38 @@
           <a:bodyPr wrap="square" rtlCol="0" anchor="t"/>
           <a:lstStyle/>
           <a:p>
-            <a:pPr algn="ctr" indent="0" marL="0">
-              <a:buNone/>
-            </a:pPr>
-            <a:r>
-              <a:rPr lang="en-US" sz="1300" dirty="0">
-                <a:solidFill>
-                  <a:srgbClr val="64748B"/>
-                </a:solidFill>
-                <a:latin typeface="Calibri" pitchFamily="34" charset="0"/>
-                <a:ea typeface="Calibri" pitchFamily="34" charset="-122"/>
-                <a:cs typeface="Calibri" pitchFamily="34" charset="-120"/>
-              </a:rPr>
-              <a:t>Thinking ефект при 671B</a:t>
-            </a:r>
-            <a:endParaRPr lang="en-US" sz="1300" dirty="0"/>
-          </a:p>
-          <a:p>
-            <a:pPr algn="ctr" indent="0" marL="0">
-              <a:buNone/>
-            </a:pPr>
-            <a:r>
-              <a:rPr lang="en-US" sz="1300" dirty="0">
-                <a:solidFill>
-                  <a:srgbClr val="64748B"/>
-                </a:solidFill>
-                <a:latin typeface="Calibri" pitchFamily="34" charset="0"/>
-                <a:ea typeface="Calibri" pitchFamily="34" charset="-122"/>
-                <a:cs typeface="Calibri" pitchFamily="34" charset="-120"/>
-              </a:rPr>
-              <a:t>(DeepSeek V3.2 parent)</a:t>
-            </a:r>
-            <a:endParaRPr lang="en-US" sz="1300" dirty="0"/>
-          </a:p>
-        </p:txBody>
-      </p:sp>
-      <p:sp>
-        <p:nvSpPr>
-          <p:cNvPr id="9" name="Shape 6"/>
-          <p:cNvSpPr/>
-          <p:nvPr/>
-        </p:nvSpPr>
-        <p:spPr>
-          <a:xfrm>
-            <a:off x="7589520" y="2743200"/>
-            <a:ext cx="3931920" cy="1188720"/>
+            <a:pPr indent="0" marL="0">
+              <a:buNone/>
+            </a:pPr>
+            <a:r>
+              <a:rPr lang="en-US" sz="1100" dirty="0">
+                <a:solidFill>
+                  <a:srgbClr val="1E293B"/>
+                </a:solidFill>
+                <a:latin typeface="Calibri" pitchFamily="34" charset="0"/>
+                <a:ea typeface="Calibri" pitchFamily="34" charset="-122"/>
+                <a:cs typeface="Calibri" pitchFamily="34" charset="-120"/>
+              </a:rPr>
+              <a:t>TF-IDF + XGBoost (Macro-F1 0.691) превъзхожда всички LLM подходи за 13-лейбъл класификация. Без GPU, &lt;1 минута inference.</a:t>
+            </a:r>
+            <a:endParaRPr lang="en-US" sz="1100" dirty="0"/>
+          </a:p>
+        </p:txBody>
+      </p:sp>
+      <p:sp>
+        <p:nvSpPr>
+          <p:cNvPr id="8" name="Shape 6"/>
+          <p:cNvSpPr/>
+          <p:nvPr/>
+        </p:nvSpPr>
+        <p:spPr>
+          <a:xfrm>
+            <a:off x="548640" y="2103120"/>
+            <a:ext cx="11094415" cy="868680"/>
           </a:xfrm>
           <a:prstGeom prst="rect">
             <a:avLst>
-              <a:gd name="adj" fmla="val 7692"/>
+              <a:gd name="adj" fmla="val 8421"/>
             </a:avLst>
           </a:prstGeom>
           <a:solidFill>
@@ -3078,73 +2949,73 @@
       </p:sp>
       <p:sp>
         <p:nvSpPr>
-          <p:cNvPr id="10" name="Shape 7"/>
-          <p:cNvSpPr/>
-          <p:nvPr/>
-        </p:nvSpPr>
-        <p:spPr>
-          <a:xfrm>
-            <a:off x="7589520" y="2743200"/>
-            <a:ext cx="3931920" cy="54864"/>
-          </a:xfrm>
-          <a:prstGeom prst="rect">
-            <a:avLst/>
-          </a:prstGeom>
-          <a:solidFill>
-            <a:srgbClr val="FF7F0E"/>
-          </a:solidFill>
-          <a:ln/>
-        </p:spPr>
-      </p:sp>
-      <p:sp>
-        <p:nvSpPr>
-          <p:cNvPr id="11" name="Text 8"/>
-          <p:cNvSpPr/>
-          <p:nvPr/>
-        </p:nvSpPr>
-        <p:spPr>
-          <a:xfrm>
-            <a:off x="7589520" y="2880360"/>
-            <a:ext cx="3931920" cy="594360"/>
-          </a:xfrm>
-          <a:prstGeom prst="rect">
-            <a:avLst/>
-          </a:prstGeom>
-          <a:noFill/>
-          <a:ln/>
-        </p:spPr>
-        <p:txBody>
-          <a:bodyPr wrap="square" rtlCol="0" anchor="ctr"/>
-          <a:lstStyle/>
-          <a:p>
-            <a:pPr algn="ctr" indent="0" marL="0">
-              <a:buNone/>
-            </a:pPr>
-            <a:r>
-              <a:rPr lang="en-US" sz="3600" b="1" dirty="0">
-                <a:solidFill>
-                  <a:srgbClr val="FF7F0E"/>
-                </a:solidFill>
-                <a:latin typeface="Consolas" pitchFamily="34" charset="0"/>
-                <a:ea typeface="Consolas" pitchFamily="34" charset="-122"/>
-                <a:cs typeface="Consolas" pitchFamily="34" charset="-120"/>
-              </a:rPr>
-              <a:t>+0.007</a:t>
-            </a:r>
-            <a:endParaRPr lang="en-US" sz="3600" dirty="0"/>
-          </a:p>
-        </p:txBody>
-      </p:sp>
-      <p:sp>
-        <p:nvSpPr>
-          <p:cNvPr id="12" name="Text 9"/>
-          <p:cNvSpPr/>
-          <p:nvPr/>
-        </p:nvSpPr>
-        <p:spPr>
-          <a:xfrm>
-            <a:off x="7680960" y="3337560"/>
-            <a:ext cx="3749040" cy="475488"/>
+          <p:cNvPr id="9" name="Shape 7"/>
+          <p:cNvSpPr/>
+          <p:nvPr/>
+        </p:nvSpPr>
+        <p:spPr>
+          <a:xfrm>
+            <a:off x="548640" y="2103120"/>
+            <a:ext cx="54864" cy="868680"/>
+          </a:xfrm>
+          <a:prstGeom prst="rect">
+            <a:avLst/>
+          </a:prstGeom>
+          <a:solidFill>
+            <a:srgbClr val="5FA8D3"/>
+          </a:solidFill>
+          <a:ln/>
+        </p:spPr>
+      </p:sp>
+      <p:sp>
+        <p:nvSpPr>
+          <p:cNvPr id="10" name="Text 8"/>
+          <p:cNvSpPr/>
+          <p:nvPr/>
+        </p:nvSpPr>
+        <p:spPr>
+          <a:xfrm>
+            <a:off x="777240" y="2148840"/>
+            <a:ext cx="3200400" cy="320040"/>
+          </a:xfrm>
+          <a:prstGeom prst="rect">
+            <a:avLst/>
+          </a:prstGeom>
+          <a:noFill/>
+          <a:ln/>
+        </p:spPr>
+        <p:txBody>
+          <a:bodyPr wrap="square" rtlCol="0" anchor="ctr"/>
+          <a:lstStyle/>
+          <a:p>
+            <a:pPr indent="0" marL="0">
+              <a:buNone/>
+            </a:pPr>
+            <a:r>
+              <a:rPr lang="en-US" sz="1400" b="1" dirty="0">
+                <a:solidFill>
+                  <a:srgbClr val="5FA8D3"/>
+                </a:solidFill>
+                <a:latin typeface="Georgia" pitchFamily="34" charset="0"/>
+                <a:ea typeface="Georgia" pitchFamily="34" charset="-122"/>
+                <a:cs typeface="Georgia" pitchFamily="34" charset="-120"/>
+              </a:rPr>
+              <a:t>Размерът на модела е решаващ</a:t>
+            </a:r>
+            <a:endParaRPr lang="en-US" sz="1400" dirty="0"/>
+          </a:p>
+        </p:txBody>
+      </p:sp>
+      <p:sp>
+        <p:nvSpPr>
+          <p:cNvPr id="11" name="Text 9"/>
+          <p:cNvSpPr/>
+          <p:nvPr/>
+        </p:nvSpPr>
+        <p:spPr>
+          <a:xfrm>
+            <a:off x="777240" y="2423160"/>
+            <a:ext cx="10637215" cy="502920"/>
           </a:xfrm>
           <a:prstGeom prst="rect">
             <a:avLst/>
@@ -3156,55 +3027,38 @@
           <a:bodyPr wrap="square" rtlCol="0" anchor="t"/>
           <a:lstStyle/>
           <a:p>
-            <a:pPr algn="ctr" indent="0" marL="0">
-              <a:buNone/>
-            </a:pPr>
-            <a:r>
-              <a:rPr lang="en-US" sz="1300" dirty="0">
-                <a:solidFill>
-                  <a:srgbClr val="64748B"/>
-                </a:solidFill>
-                <a:latin typeface="Calibri" pitchFamily="34" charset="0"/>
-                <a:ea typeface="Calibri" pitchFamily="34" charset="-122"/>
-                <a:cs typeface="Calibri" pitchFamily="34" charset="-120"/>
-              </a:rPr>
-              <a:t>Thinking ефект при 8B</a:t>
-            </a:r>
-            <a:endParaRPr lang="en-US" sz="1300" dirty="0"/>
-          </a:p>
-          <a:p>
-            <a:pPr algn="ctr" indent="0" marL="0">
-              <a:buNone/>
-            </a:pPr>
-            <a:r>
-              <a:rPr lang="en-US" sz="1300" dirty="0">
-                <a:solidFill>
-                  <a:srgbClr val="64748B"/>
-                </a:solidFill>
-                <a:latin typeface="Calibri" pitchFamily="34" charset="0"/>
-                <a:ea typeface="Calibri" pitchFamily="34" charset="-122"/>
-                <a:cs typeface="Calibri" pitchFamily="34" charset="-120"/>
-              </a:rPr>
-              <a:t>(Qwen3-8B FS taxonomy)</a:t>
-            </a:r>
-            <a:endParaRPr lang="en-US" sz="1300" dirty="0"/>
-          </a:p>
-        </p:txBody>
-      </p:sp>
-      <p:sp>
-        <p:nvSpPr>
-          <p:cNvPr id="13" name="Shape 10"/>
-          <p:cNvSpPr/>
-          <p:nvPr/>
-        </p:nvSpPr>
-        <p:spPr>
-          <a:xfrm>
-            <a:off x="7589520" y="4206240"/>
-            <a:ext cx="3931920" cy="1188720"/>
+            <a:pPr indent="0" marL="0">
+              <a:buNone/>
+            </a:pPr>
+            <a:r>
+              <a:rPr lang="en-US" sz="1100" dirty="0">
+                <a:solidFill>
+                  <a:srgbClr val="1E293B"/>
+                </a:solidFill>
+                <a:latin typeface="Calibri" pitchFamily="34" charset="0"/>
+                <a:ea typeface="Calibri" pitchFamily="34" charset="-122"/>
+                <a:cs typeface="Calibri" pitchFamily="34" charset="-120"/>
+              </a:rPr>
+              <a:t>675B MoE (Mistral Large 3: 0.658) значително надминава 8B (Qwen3: 0.510). Fine-tuning на 8B не компенсира разликата.</a:t>
+            </a:r>
+            <a:endParaRPr lang="en-US" sz="1100" dirty="0"/>
+          </a:p>
+        </p:txBody>
+      </p:sp>
+      <p:sp>
+        <p:nvSpPr>
+          <p:cNvPr id="12" name="Shape 10"/>
+          <p:cNvSpPr/>
+          <p:nvPr/>
+        </p:nvSpPr>
+        <p:spPr>
+          <a:xfrm>
+            <a:off x="548640" y="3108960"/>
+            <a:ext cx="11094415" cy="868680"/>
           </a:xfrm>
           <a:prstGeom prst="rect">
             <a:avLst>
-              <a:gd name="adj" fmla="val 7692"/>
+              <a:gd name="adj" fmla="val 8421"/>
             </a:avLst>
           </a:prstGeom>
           <a:solidFill>
@@ -3222,14 +3076,141 @@
       </p:sp>
       <p:sp>
         <p:nvSpPr>
-          <p:cNvPr id="14" name="Shape 11"/>
-          <p:cNvSpPr/>
-          <p:nvPr/>
-        </p:nvSpPr>
-        <p:spPr>
-          <a:xfrm>
-            <a:off x="7589520" y="4206240"/>
-            <a:ext cx="3931920" cy="54864"/>
+          <p:cNvPr id="13" name="Shape 11"/>
+          <p:cNvSpPr/>
+          <p:nvPr/>
+        </p:nvSpPr>
+        <p:spPr>
+          <a:xfrm>
+            <a:off x="548640" y="3108960"/>
+            <a:ext cx="54864" cy="868680"/>
+          </a:xfrm>
+          <a:prstGeom prst="rect">
+            <a:avLst/>
+          </a:prstGeom>
+          <a:solidFill>
+            <a:srgbClr val="FF7F0E"/>
+          </a:solidFill>
+          <a:ln/>
+        </p:spPr>
+      </p:sp>
+      <p:sp>
+        <p:nvSpPr>
+          <p:cNvPr id="14" name="Text 12"/>
+          <p:cNvSpPr/>
+          <p:nvPr/>
+        </p:nvSpPr>
+        <p:spPr>
+          <a:xfrm>
+            <a:off x="777240" y="3154680"/>
+            <a:ext cx="3200400" cy="320040"/>
+          </a:xfrm>
+          <a:prstGeom prst="rect">
+            <a:avLst/>
+          </a:prstGeom>
+          <a:noFill/>
+          <a:ln/>
+        </p:spPr>
+        <p:txBody>
+          <a:bodyPr wrap="square" rtlCol="0" anchor="ctr"/>
+          <a:lstStyle/>
+          <a:p>
+            <a:pPr indent="0" marL="0">
+              <a:buNone/>
+            </a:pPr>
+            <a:r>
+              <a:rPr lang="en-US" sz="1400" b="1" dirty="0">
+                <a:solidFill>
+                  <a:srgbClr val="FF7F0E"/>
+                </a:solidFill>
+                <a:latin typeface="Georgia" pitchFamily="34" charset="0"/>
+                <a:ea typeface="Georgia" pitchFamily="34" charset="-122"/>
+                <a:cs typeface="Georgia" pitchFamily="34" charset="-120"/>
+              </a:rPr>
+              <a:t>Taxonomy промптинг помага</a:t>
+            </a:r>
+            <a:endParaRPr lang="en-US" sz="1400" dirty="0"/>
+          </a:p>
+        </p:txBody>
+      </p:sp>
+      <p:sp>
+        <p:nvSpPr>
+          <p:cNvPr id="15" name="Text 13"/>
+          <p:cNvSpPr/>
+          <p:nvPr/>
+        </p:nvSpPr>
+        <p:spPr>
+          <a:xfrm>
+            <a:off x="777240" y="3429000"/>
+            <a:ext cx="10637215" cy="502920"/>
+          </a:xfrm>
+          <a:prstGeom prst="rect">
+            <a:avLst/>
+          </a:prstGeom>
+          <a:noFill/>
+          <a:ln/>
+        </p:spPr>
+        <p:txBody>
+          <a:bodyPr wrap="square" rtlCol="0" anchor="t"/>
+          <a:lstStyle/>
+          <a:p>
+            <a:pPr indent="0" marL="0">
+              <a:buNone/>
+            </a:pPr>
+            <a:r>
+              <a:rPr lang="en-US" sz="1100" dirty="0">
+                <a:solidFill>
+                  <a:srgbClr val="1E293B"/>
+                </a:solidFill>
+                <a:latin typeface="Calibri" pitchFamily="34" charset="0"/>
+                <a:ea typeface="Calibri" pitchFamily="34" charset="-122"/>
+                <a:cs typeface="Calibri" pitchFamily="34" charset="-120"/>
+              </a:rPr>
+              <a:t>Подкатегории + разграничителни подсказки подобряват Qwen3-8B с +0.073 Macro-F1. Особено полезно за малки модели.</a:t>
+            </a:r>
+            <a:endParaRPr lang="en-US" sz="1100" dirty="0"/>
+          </a:p>
+        </p:txBody>
+      </p:sp>
+      <p:sp>
+        <p:nvSpPr>
+          <p:cNvPr id="16" name="Shape 14"/>
+          <p:cNvSpPr/>
+          <p:nvPr/>
+        </p:nvSpPr>
+        <p:spPr>
+          <a:xfrm>
+            <a:off x="548640" y="4114800"/>
+            <a:ext cx="11094415" cy="868680"/>
+          </a:xfrm>
+          <a:prstGeom prst="rect">
+            <a:avLst>
+              <a:gd name="adj" fmla="val 8421"/>
+            </a:avLst>
+          </a:prstGeom>
+          <a:solidFill>
+            <a:srgbClr val="FFFFFF"/>
+          </a:solidFill>
+          <a:ln/>
+          <a:effectLst>
+            <a:outerShdw sx="100000" sy="100000" kx="0" ky="0" algn="bl" rotWithShape="0" blurRad="50800" dist="25400" dir="16200000">
+              <a:srgbClr val="000000">
+                <a:alpha val="15000"/>
+              </a:srgbClr>
+            </a:outerShdw>
+          </a:effectLst>
+        </p:spPr>
+      </p:sp>
+      <p:sp>
+        <p:nvSpPr>
+          <p:cNvPr id="17" name="Shape 15"/>
+          <p:cNvSpPr/>
+          <p:nvPr/>
+        </p:nvSpPr>
+        <p:spPr>
+          <a:xfrm>
+            <a:off x="548640" y="4114800"/>
+            <a:ext cx="54864" cy="868680"/>
           </a:xfrm>
           <a:prstGeom prst="rect">
             <a:avLst/>
@@ -3242,53 +3223,53 @@
       </p:sp>
       <p:sp>
         <p:nvSpPr>
-          <p:cNvPr id="15" name="Text 12"/>
-          <p:cNvSpPr/>
-          <p:nvPr/>
-        </p:nvSpPr>
-        <p:spPr>
-          <a:xfrm>
-            <a:off x="7589520" y="4343400"/>
-            <a:ext cx="3931920" cy="594360"/>
-          </a:xfrm>
-          <a:prstGeom prst="rect">
-            <a:avLst/>
-          </a:prstGeom>
-          <a:noFill/>
-          <a:ln/>
-        </p:spPr>
-        <p:txBody>
-          <a:bodyPr wrap="square" rtlCol="0" anchor="ctr"/>
-          <a:lstStyle/>
-          <a:p>
-            <a:pPr algn="ctr" indent="0" marL="0">
-              <a:buNone/>
-            </a:pPr>
-            <a:r>
-              <a:rPr lang="en-US" sz="3600" b="1" dirty="0">
+          <p:cNvPr id="18" name="Text 16"/>
+          <p:cNvSpPr/>
+          <p:nvPr/>
+        </p:nvSpPr>
+        <p:spPr>
+          <a:xfrm>
+            <a:off x="777240" y="4160520"/>
+            <a:ext cx="3200400" cy="320040"/>
+          </a:xfrm>
+          <a:prstGeom prst="rect">
+            <a:avLst/>
+          </a:prstGeom>
+          <a:noFill/>
+          <a:ln/>
+        </p:spPr>
+        <p:txBody>
+          <a:bodyPr wrap="square" rtlCol="0" anchor="ctr"/>
+          <a:lstStyle/>
+          <a:p>
+            <a:pPr indent="0" marL="0">
+              <a:buNone/>
+            </a:pPr>
+            <a:r>
+              <a:rPr lang="en-US" sz="1400" b="1" dirty="0">
                 <a:solidFill>
                   <a:srgbClr val="D62728"/>
                 </a:solidFill>
-                <a:latin typeface="Consolas" pitchFamily="34" charset="0"/>
-                <a:ea typeface="Consolas" pitchFamily="34" charset="-122"/>
-                <a:cs typeface="Consolas" pitchFamily="34" charset="-120"/>
-              </a:rPr>
-              <a:t>−0.003</a:t>
-            </a:r>
-            <a:endParaRPr lang="en-US" sz="3600" dirty="0"/>
-          </a:p>
-        </p:txBody>
-      </p:sp>
-      <p:sp>
-        <p:nvSpPr>
-          <p:cNvPr id="16" name="Text 13"/>
-          <p:cNvSpPr/>
-          <p:nvPr/>
-        </p:nvSpPr>
-        <p:spPr>
-          <a:xfrm>
-            <a:off x="7680960" y="4800600"/>
-            <a:ext cx="3749040" cy="475488"/>
+                <a:latin typeface="Georgia" pitchFamily="34" charset="0"/>
+                <a:ea typeface="Georgia" pitchFamily="34" charset="-122"/>
+                <a:cs typeface="Georgia" pitchFamily="34" charset="-120"/>
+              </a:rPr>
+              <a:t>Thinking mode — нюансиран ефект</a:t>
+            </a:r>
+            <a:endParaRPr lang="en-US" sz="1400" dirty="0"/>
+          </a:p>
+        </p:txBody>
+      </p:sp>
+      <p:sp>
+        <p:nvSpPr>
+          <p:cNvPr id="19" name="Text 17"/>
+          <p:cNvSpPr/>
+          <p:nvPr/>
+        </p:nvSpPr>
+        <p:spPr>
+          <a:xfrm>
+            <a:off x="777240" y="4434840"/>
+            <a:ext cx="10637215" cy="502920"/>
           </a:xfrm>
           <a:prstGeom prst="rect">
             <a:avLst/>
@@ -3300,67 +3281,11 @@
           <a:bodyPr wrap="square" rtlCol="0" anchor="t"/>
           <a:lstStyle/>
           <a:p>
-            <a:pPr algn="ctr" indent="0" marL="0">
-              <a:buNone/>
-            </a:pPr>
-            <a:r>
-              <a:rPr lang="en-US" sz="1300" dirty="0">
-                <a:solidFill>
-                  <a:srgbClr val="64748B"/>
-                </a:solidFill>
-                <a:latin typeface="Calibri" pitchFamily="34" charset="0"/>
-                <a:ea typeface="Calibri" pitchFamily="34" charset="-122"/>
-                <a:cs typeface="Calibri" pitchFamily="34" charset="-120"/>
-              </a:rPr>
-              <a:t>Thinking при 48 лейбъла</a:t>
-            </a:r>
-            <a:endParaRPr lang="en-US" sz="1300" dirty="0"/>
-          </a:p>
-          <a:p>
-            <a:pPr algn="ctr" indent="0" marL="0">
-              <a:buNone/>
-            </a:pPr>
-            <a:r>
-              <a:rPr lang="en-US" sz="1300" dirty="0">
-                <a:solidFill>
-                  <a:srgbClr val="64748B"/>
-                </a:solidFill>
-                <a:latin typeface="Calibri" pitchFamily="34" charset="0"/>
-                <a:ea typeface="Calibri" pitchFamily="34" charset="-122"/>
-                <a:cs typeface="Calibri" pitchFamily="34" charset="-120"/>
-              </a:rPr>
-              <a:t>(DeepSeek subcategory)</a:t>
-            </a:r>
-            <a:endParaRPr lang="en-US" sz="1300" dirty="0"/>
-          </a:p>
-        </p:txBody>
-      </p:sp>
-      <p:sp>
-        <p:nvSpPr>
-          <p:cNvPr id="17" name="Text 14"/>
-          <p:cNvSpPr/>
-          <p:nvPr/>
-        </p:nvSpPr>
-        <p:spPr>
-          <a:xfrm>
-            <a:off x="0" y="6217920"/>
-            <a:ext cx="12191695" cy="320040"/>
-          </a:xfrm>
-          <a:prstGeom prst="rect">
-            <a:avLst/>
-          </a:prstGeom>
-          <a:noFill/>
-          <a:ln/>
-        </p:spPr>
-        <p:txBody>
-          <a:bodyPr wrap="square" rtlCol="0" anchor="ctr"/>
-          <a:lstStyle/>
-          <a:p>
-            <a:pPr algn="ctr" indent="0" marL="0">
-              <a:buNone/>
-            </a:pPr>
-            <a:r>
-              <a:rPr lang="en-US" sz="1200" i="1" dirty="0">
+            <a:pPr indent="0" marL="0">
+              <a:buNone/>
+            </a:pPr>
+            <a:r>
+              <a:rPr lang="en-US" sz="1100" dirty="0">
                 <a:solidFill>
                   <a:srgbClr val="1E293B"/>
                 </a:solidFill>
@@ -3368,15 +3293,15 @@
                 <a:ea typeface="Calibri" pitchFamily="34" charset="-122"/>
                 <a:cs typeface="Calibri" pitchFamily="34" charset="-120"/>
               </a:rPr>
-              <a:t>Thinking mode работи при 671B за прости задачи, но вреди при сложни (48 лейбъла, 21.6% parse failures)</a:t>
-            </a:r>
-            <a:endParaRPr lang="en-US" sz="1200" dirty="0"/>
-          </a:p>
-        </p:txBody>
-      </p:sp>
-      <p:sp>
-        <p:nvSpPr>
-          <p:cNvPr id="18" name="Text 15"/>
+              <a:t>При 671B: +0.058 F1 за 13 лейбъла, но −0.003 за 48 лейбъла (21.6% parse failures). При 8B: пренебрежим ефект (+0.007).</a:t>
+            </a:r>
+            <a:endParaRPr lang="en-US" sz="1100" dirty="0"/>
+          </a:p>
+        </p:txBody>
+      </p:sp>
+      <p:sp>
+        <p:nvSpPr>
+          <p:cNvPr id="20" name="Text 18"/>
           <p:cNvSpPr/>
           <p:nvPr/>
         </p:nvSpPr>
@@ -3407,7 +3332,7 @@
                 <a:ea typeface="Calibri" pitchFamily="34" charset="-122"/>
                 <a:cs typeface="Calibri" pitchFamily="34" charset="-120"/>
               </a:rPr>
-              <a:t>11 / 13</a:t>
+              <a:t>11 / 12</a:t>
             </a:r>
             <a:endParaRPr lang="en-US" sz="1000" dirty="0"/>
           </a:p>
@@ -3424,771 +3349,6 @@
 <file path=ppt/slides/slide12.xml><?xml version="1.0" encoding="utf-8"?>
 <p:sld xmlns:a="http://schemas.openxmlformats.org/drawingml/2006/main" xmlns:r="http://schemas.openxmlformats.org/officeDocument/2006/relationships" xmlns:p="http://schemas.openxmlformats.org/presentationml/2006/main">
   <p:cSld name="Slide 12">
-    <p:bg>
-      <p:bgPr>
-        <a:solidFill>
-          <a:srgbClr val="F8F9FA"/>
-        </a:solidFill>
-      </p:bgPr>
-    </p:bg>
-    <p:spTree>
-      <p:nvGrpSpPr>
-        <p:cNvPr id="1" name=""/>
-        <p:cNvGrpSpPr/>
-        <p:nvPr/>
-      </p:nvGrpSpPr>
-      <p:grpSpPr>
-        <a:xfrm>
-          <a:off x="0" y="0"/>
-          <a:ext cx="0" cy="0"/>
-          <a:chOff x="0" y="0"/>
-          <a:chExt cx="0" cy="0"/>
-        </a:xfrm>
-      </p:grpSpPr>
-      <p:sp>
-        <p:nvSpPr>
-          <p:cNvPr id="2" name="Shape 0"/>
-          <p:cNvSpPr/>
-          <p:nvPr/>
-        </p:nvSpPr>
-        <p:spPr>
-          <a:xfrm>
-            <a:off x="0" y="0"/>
-            <a:ext cx="12191695" cy="822960"/>
-          </a:xfrm>
-          <a:prstGeom prst="rect">
-            <a:avLst/>
-          </a:prstGeom>
-          <a:solidFill>
-            <a:srgbClr val="1B4965"/>
-          </a:solidFill>
-          <a:ln/>
-        </p:spPr>
-      </p:sp>
-      <p:sp>
-        <p:nvSpPr>
-          <p:cNvPr id="3" name="Text 1"/>
-          <p:cNvSpPr/>
-          <p:nvPr/>
-        </p:nvSpPr>
-        <p:spPr>
-          <a:xfrm>
-            <a:off x="548640" y="137160"/>
-            <a:ext cx="11094415" cy="548640"/>
-          </a:xfrm>
-          <a:prstGeom prst="rect">
-            <a:avLst/>
-          </a:prstGeom>
-          <a:noFill/>
-          <a:ln/>
-        </p:spPr>
-        <p:txBody>
-          <a:bodyPr wrap="square" rtlCol="0" anchor="ctr"/>
-          <a:lstStyle/>
-          <a:p>
-            <a:pPr indent="0" marL="0">
-              <a:buNone/>
-            </a:pPr>
-            <a:r>
-              <a:rPr lang="en-US" sz="2600" b="1" dirty="0">
-                <a:solidFill>
-                  <a:srgbClr val="FFFFFF"/>
-                </a:solidFill>
-                <a:latin typeface="Georgia" pitchFamily="34" charset="0"/>
-                <a:ea typeface="Georgia" pitchFamily="34" charset="-122"/>
-                <a:cs typeface="Georgia" pitchFamily="34" charset="-120"/>
-              </a:rPr>
-              <a:t>Ключови находки</a:t>
-            </a:r>
-            <a:endParaRPr lang="en-US" sz="2600" dirty="0"/>
-          </a:p>
-        </p:txBody>
-      </p:sp>
-      <p:sp>
-        <p:nvSpPr>
-          <p:cNvPr id="4" name="Shape 2"/>
-          <p:cNvSpPr/>
-          <p:nvPr/>
-        </p:nvSpPr>
-        <p:spPr>
-          <a:xfrm>
-            <a:off x="548640" y="1097280"/>
-            <a:ext cx="11094415" cy="868680"/>
-          </a:xfrm>
-          <a:prstGeom prst="rect">
-            <a:avLst>
-              <a:gd name="adj" fmla="val 8421"/>
-            </a:avLst>
-          </a:prstGeom>
-          <a:solidFill>
-            <a:srgbClr val="FFFFFF"/>
-          </a:solidFill>
-          <a:ln/>
-          <a:effectLst>
-            <a:outerShdw sx="100000" sy="100000" kx="0" ky="0" algn="bl" rotWithShape="0" blurRad="50800" dist="25400" dir="16200000">
-              <a:srgbClr val="000000">
-                <a:alpha val="15000"/>
-              </a:srgbClr>
-            </a:outerShdw>
-          </a:effectLst>
-        </p:spPr>
-      </p:sp>
-      <p:sp>
-        <p:nvSpPr>
-          <p:cNvPr id="5" name="Shape 3"/>
-          <p:cNvSpPr/>
-          <p:nvPr/>
-        </p:nvSpPr>
-        <p:spPr>
-          <a:xfrm>
-            <a:off x="548640" y="1097280"/>
-            <a:ext cx="54864" cy="868680"/>
-          </a:xfrm>
-          <a:prstGeom prst="rect">
-            <a:avLst/>
-          </a:prstGeom>
-          <a:solidFill>
-            <a:srgbClr val="2CA02C"/>
-          </a:solidFill>
-          <a:ln/>
-        </p:spPr>
-      </p:sp>
-      <p:sp>
-        <p:nvSpPr>
-          <p:cNvPr id="6" name="Text 4"/>
-          <p:cNvSpPr/>
-          <p:nvPr/>
-        </p:nvSpPr>
-        <p:spPr>
-          <a:xfrm>
-            <a:off x="777240" y="1143000"/>
-            <a:ext cx="3200400" cy="320040"/>
-          </a:xfrm>
-          <a:prstGeom prst="rect">
-            <a:avLst/>
-          </a:prstGeom>
-          <a:noFill/>
-          <a:ln/>
-        </p:spPr>
-        <p:txBody>
-          <a:bodyPr wrap="square" rtlCol="0" anchor="ctr"/>
-          <a:lstStyle/>
-          <a:p>
-            <a:pPr indent="0" marL="0">
-              <a:buNone/>
-            </a:pPr>
-            <a:r>
-              <a:rPr lang="en-US" sz="1400" b="1" dirty="0">
-                <a:solidFill>
-                  <a:srgbClr val="2CA02C"/>
-                </a:solidFill>
-                <a:latin typeface="Georgia" pitchFamily="34" charset="0"/>
-                <a:ea typeface="Georgia" pitchFamily="34" charset="-122"/>
-                <a:cs typeface="Georgia" pitchFamily="34" charset="-120"/>
-              </a:rPr>
-              <a:t>Classic ML доминира</a:t>
-            </a:r>
-            <a:endParaRPr lang="en-US" sz="1400" dirty="0"/>
-          </a:p>
-        </p:txBody>
-      </p:sp>
-      <p:sp>
-        <p:nvSpPr>
-          <p:cNvPr id="7" name="Text 5"/>
-          <p:cNvSpPr/>
-          <p:nvPr/>
-        </p:nvSpPr>
-        <p:spPr>
-          <a:xfrm>
-            <a:off x="777240" y="1417320"/>
-            <a:ext cx="10637215" cy="502920"/>
-          </a:xfrm>
-          <a:prstGeom prst="rect">
-            <a:avLst/>
-          </a:prstGeom>
-          <a:noFill/>
-          <a:ln/>
-        </p:spPr>
-        <p:txBody>
-          <a:bodyPr wrap="square" rtlCol="0" anchor="t"/>
-          <a:lstStyle/>
-          <a:p>
-            <a:pPr indent="0" marL="0">
-              <a:buNone/>
-            </a:pPr>
-            <a:r>
-              <a:rPr lang="en-US" sz="1100" dirty="0">
-                <a:solidFill>
-                  <a:srgbClr val="1E293B"/>
-                </a:solidFill>
-                <a:latin typeface="Calibri" pitchFamily="34" charset="0"/>
-                <a:ea typeface="Calibri" pitchFamily="34" charset="-122"/>
-                <a:cs typeface="Calibri" pitchFamily="34" charset="-120"/>
-              </a:rPr>
-              <a:t>TF-IDF + XGBoost (Macro-F1 0.691) превъзхожда всички LLM подходи за 13-лейбъл класификация. Без GPU, &lt;1 минута inference.</a:t>
-            </a:r>
-            <a:endParaRPr lang="en-US" sz="1100" dirty="0"/>
-          </a:p>
-        </p:txBody>
-      </p:sp>
-      <p:sp>
-        <p:nvSpPr>
-          <p:cNvPr id="8" name="Shape 6"/>
-          <p:cNvSpPr/>
-          <p:nvPr/>
-        </p:nvSpPr>
-        <p:spPr>
-          <a:xfrm>
-            <a:off x="548640" y="2103120"/>
-            <a:ext cx="11094415" cy="868680"/>
-          </a:xfrm>
-          <a:prstGeom prst="rect">
-            <a:avLst>
-              <a:gd name="adj" fmla="val 8421"/>
-            </a:avLst>
-          </a:prstGeom>
-          <a:solidFill>
-            <a:srgbClr val="FFFFFF"/>
-          </a:solidFill>
-          <a:ln/>
-          <a:effectLst>
-            <a:outerShdw sx="100000" sy="100000" kx="0" ky="0" algn="bl" rotWithShape="0" blurRad="50800" dist="25400" dir="16200000">
-              <a:srgbClr val="000000">
-                <a:alpha val="15000"/>
-              </a:srgbClr>
-            </a:outerShdw>
-          </a:effectLst>
-        </p:spPr>
-      </p:sp>
-      <p:sp>
-        <p:nvSpPr>
-          <p:cNvPr id="9" name="Shape 7"/>
-          <p:cNvSpPr/>
-          <p:nvPr/>
-        </p:nvSpPr>
-        <p:spPr>
-          <a:xfrm>
-            <a:off x="548640" y="2103120"/>
-            <a:ext cx="54864" cy="868680"/>
-          </a:xfrm>
-          <a:prstGeom prst="rect">
-            <a:avLst/>
-          </a:prstGeom>
-          <a:solidFill>
-            <a:srgbClr val="5FA8D3"/>
-          </a:solidFill>
-          <a:ln/>
-        </p:spPr>
-      </p:sp>
-      <p:sp>
-        <p:nvSpPr>
-          <p:cNvPr id="10" name="Text 8"/>
-          <p:cNvSpPr/>
-          <p:nvPr/>
-        </p:nvSpPr>
-        <p:spPr>
-          <a:xfrm>
-            <a:off x="777240" y="2148840"/>
-            <a:ext cx="3200400" cy="320040"/>
-          </a:xfrm>
-          <a:prstGeom prst="rect">
-            <a:avLst/>
-          </a:prstGeom>
-          <a:noFill/>
-          <a:ln/>
-        </p:spPr>
-        <p:txBody>
-          <a:bodyPr wrap="square" rtlCol="0" anchor="ctr"/>
-          <a:lstStyle/>
-          <a:p>
-            <a:pPr indent="0" marL="0">
-              <a:buNone/>
-            </a:pPr>
-            <a:r>
-              <a:rPr lang="en-US" sz="1400" b="1" dirty="0">
-                <a:solidFill>
-                  <a:srgbClr val="5FA8D3"/>
-                </a:solidFill>
-                <a:latin typeface="Georgia" pitchFamily="34" charset="0"/>
-                <a:ea typeface="Georgia" pitchFamily="34" charset="-122"/>
-                <a:cs typeface="Georgia" pitchFamily="34" charset="-120"/>
-              </a:rPr>
-              <a:t>Размерът на модела е решаващ</a:t>
-            </a:r>
-            <a:endParaRPr lang="en-US" sz="1400" dirty="0"/>
-          </a:p>
-        </p:txBody>
-      </p:sp>
-      <p:sp>
-        <p:nvSpPr>
-          <p:cNvPr id="11" name="Text 9"/>
-          <p:cNvSpPr/>
-          <p:nvPr/>
-        </p:nvSpPr>
-        <p:spPr>
-          <a:xfrm>
-            <a:off x="777240" y="2423160"/>
-            <a:ext cx="10637215" cy="502920"/>
-          </a:xfrm>
-          <a:prstGeom prst="rect">
-            <a:avLst/>
-          </a:prstGeom>
-          <a:noFill/>
-          <a:ln/>
-        </p:spPr>
-        <p:txBody>
-          <a:bodyPr wrap="square" rtlCol="0" anchor="t"/>
-          <a:lstStyle/>
-          <a:p>
-            <a:pPr indent="0" marL="0">
-              <a:buNone/>
-            </a:pPr>
-            <a:r>
-              <a:rPr lang="en-US" sz="1100" dirty="0">
-                <a:solidFill>
-                  <a:srgbClr val="1E293B"/>
-                </a:solidFill>
-                <a:latin typeface="Calibri" pitchFamily="34" charset="0"/>
-                <a:ea typeface="Calibri" pitchFamily="34" charset="-122"/>
-                <a:cs typeface="Calibri" pitchFamily="34" charset="-120"/>
-              </a:rPr>
-              <a:t>675B MoE (Mistral Large 3: 0.658) значително надминава 8B (Qwen3: 0.510). Fine-tuning на 8B не компенсира разликата.</a:t>
-            </a:r>
-            <a:endParaRPr lang="en-US" sz="1100" dirty="0"/>
-          </a:p>
-        </p:txBody>
-      </p:sp>
-      <p:sp>
-        <p:nvSpPr>
-          <p:cNvPr id="12" name="Shape 10"/>
-          <p:cNvSpPr/>
-          <p:nvPr/>
-        </p:nvSpPr>
-        <p:spPr>
-          <a:xfrm>
-            <a:off x="548640" y="3108960"/>
-            <a:ext cx="11094415" cy="868680"/>
-          </a:xfrm>
-          <a:prstGeom prst="rect">
-            <a:avLst>
-              <a:gd name="adj" fmla="val 8421"/>
-            </a:avLst>
-          </a:prstGeom>
-          <a:solidFill>
-            <a:srgbClr val="FFFFFF"/>
-          </a:solidFill>
-          <a:ln/>
-          <a:effectLst>
-            <a:outerShdw sx="100000" sy="100000" kx="0" ky="0" algn="bl" rotWithShape="0" blurRad="50800" dist="25400" dir="16200000">
-              <a:srgbClr val="000000">
-                <a:alpha val="15000"/>
-              </a:srgbClr>
-            </a:outerShdw>
-          </a:effectLst>
-        </p:spPr>
-      </p:sp>
-      <p:sp>
-        <p:nvSpPr>
-          <p:cNvPr id="13" name="Shape 11"/>
-          <p:cNvSpPr/>
-          <p:nvPr/>
-        </p:nvSpPr>
-        <p:spPr>
-          <a:xfrm>
-            <a:off x="548640" y="3108960"/>
-            <a:ext cx="54864" cy="868680"/>
-          </a:xfrm>
-          <a:prstGeom prst="rect">
-            <a:avLst/>
-          </a:prstGeom>
-          <a:solidFill>
-            <a:srgbClr val="FF7F0E"/>
-          </a:solidFill>
-          <a:ln/>
-        </p:spPr>
-      </p:sp>
-      <p:sp>
-        <p:nvSpPr>
-          <p:cNvPr id="14" name="Text 12"/>
-          <p:cNvSpPr/>
-          <p:nvPr/>
-        </p:nvSpPr>
-        <p:spPr>
-          <a:xfrm>
-            <a:off x="777240" y="3154680"/>
-            <a:ext cx="3200400" cy="320040"/>
-          </a:xfrm>
-          <a:prstGeom prst="rect">
-            <a:avLst/>
-          </a:prstGeom>
-          <a:noFill/>
-          <a:ln/>
-        </p:spPr>
-        <p:txBody>
-          <a:bodyPr wrap="square" rtlCol="0" anchor="ctr"/>
-          <a:lstStyle/>
-          <a:p>
-            <a:pPr indent="0" marL="0">
-              <a:buNone/>
-            </a:pPr>
-            <a:r>
-              <a:rPr lang="en-US" sz="1400" b="1" dirty="0">
-                <a:solidFill>
-                  <a:srgbClr val="FF7F0E"/>
-                </a:solidFill>
-                <a:latin typeface="Georgia" pitchFamily="34" charset="0"/>
-                <a:ea typeface="Georgia" pitchFamily="34" charset="-122"/>
-                <a:cs typeface="Georgia" pitchFamily="34" charset="-120"/>
-              </a:rPr>
-              <a:t>Taxonomy промптинг помага</a:t>
-            </a:r>
-            <a:endParaRPr lang="en-US" sz="1400" dirty="0"/>
-          </a:p>
-        </p:txBody>
-      </p:sp>
-      <p:sp>
-        <p:nvSpPr>
-          <p:cNvPr id="15" name="Text 13"/>
-          <p:cNvSpPr/>
-          <p:nvPr/>
-        </p:nvSpPr>
-        <p:spPr>
-          <a:xfrm>
-            <a:off x="777240" y="3429000"/>
-            <a:ext cx="10637215" cy="502920"/>
-          </a:xfrm>
-          <a:prstGeom prst="rect">
-            <a:avLst/>
-          </a:prstGeom>
-          <a:noFill/>
-          <a:ln/>
-        </p:spPr>
-        <p:txBody>
-          <a:bodyPr wrap="square" rtlCol="0" anchor="t"/>
-          <a:lstStyle/>
-          <a:p>
-            <a:pPr indent="0" marL="0">
-              <a:buNone/>
-            </a:pPr>
-            <a:r>
-              <a:rPr lang="en-US" sz="1100" dirty="0">
-                <a:solidFill>
-                  <a:srgbClr val="1E293B"/>
-                </a:solidFill>
-                <a:latin typeface="Calibri" pitchFamily="34" charset="0"/>
-                <a:ea typeface="Calibri" pitchFamily="34" charset="-122"/>
-                <a:cs typeface="Calibri" pitchFamily="34" charset="-120"/>
-              </a:rPr>
-              <a:t>Подкатегории + разграничителни подсказки подобряват Qwen3-8B с +0.073 Macro-F1. Особено полезно за малки модели.</a:t>
-            </a:r>
-            <a:endParaRPr lang="en-US" sz="1100" dirty="0"/>
-          </a:p>
-        </p:txBody>
-      </p:sp>
-      <p:sp>
-        <p:nvSpPr>
-          <p:cNvPr id="16" name="Shape 14"/>
-          <p:cNvSpPr/>
-          <p:nvPr/>
-        </p:nvSpPr>
-        <p:spPr>
-          <a:xfrm>
-            <a:off x="548640" y="4114800"/>
-            <a:ext cx="11094415" cy="868680"/>
-          </a:xfrm>
-          <a:prstGeom prst="rect">
-            <a:avLst>
-              <a:gd name="adj" fmla="val 8421"/>
-            </a:avLst>
-          </a:prstGeom>
-          <a:solidFill>
-            <a:srgbClr val="FFFFFF"/>
-          </a:solidFill>
-          <a:ln/>
-          <a:effectLst>
-            <a:outerShdw sx="100000" sy="100000" kx="0" ky="0" algn="bl" rotWithShape="0" blurRad="50800" dist="25400" dir="16200000">
-              <a:srgbClr val="000000">
-                <a:alpha val="15000"/>
-              </a:srgbClr>
-            </a:outerShdw>
-          </a:effectLst>
-        </p:spPr>
-      </p:sp>
-      <p:sp>
-        <p:nvSpPr>
-          <p:cNvPr id="17" name="Shape 15"/>
-          <p:cNvSpPr/>
-          <p:nvPr/>
-        </p:nvSpPr>
-        <p:spPr>
-          <a:xfrm>
-            <a:off x="548640" y="4114800"/>
-            <a:ext cx="54864" cy="868680"/>
-          </a:xfrm>
-          <a:prstGeom prst="rect">
-            <a:avLst/>
-          </a:prstGeom>
-          <a:solidFill>
-            <a:srgbClr val="D62728"/>
-          </a:solidFill>
-          <a:ln/>
-        </p:spPr>
-      </p:sp>
-      <p:sp>
-        <p:nvSpPr>
-          <p:cNvPr id="18" name="Text 16"/>
-          <p:cNvSpPr/>
-          <p:nvPr/>
-        </p:nvSpPr>
-        <p:spPr>
-          <a:xfrm>
-            <a:off x="777240" y="4160520"/>
-            <a:ext cx="3200400" cy="320040"/>
-          </a:xfrm>
-          <a:prstGeom prst="rect">
-            <a:avLst/>
-          </a:prstGeom>
-          <a:noFill/>
-          <a:ln/>
-        </p:spPr>
-        <p:txBody>
-          <a:bodyPr wrap="square" rtlCol="0" anchor="ctr"/>
-          <a:lstStyle/>
-          <a:p>
-            <a:pPr indent="0" marL="0">
-              <a:buNone/>
-            </a:pPr>
-            <a:r>
-              <a:rPr lang="en-US" sz="1400" b="1" dirty="0">
-                <a:solidFill>
-                  <a:srgbClr val="D62728"/>
-                </a:solidFill>
-                <a:latin typeface="Georgia" pitchFamily="34" charset="0"/>
-                <a:ea typeface="Georgia" pitchFamily="34" charset="-122"/>
-                <a:cs typeface="Georgia" pitchFamily="34" charset="-120"/>
-              </a:rPr>
-              <a:t>Thinking mode — нюансиран ефект</a:t>
-            </a:r>
-            <a:endParaRPr lang="en-US" sz="1400" dirty="0"/>
-          </a:p>
-        </p:txBody>
-      </p:sp>
-      <p:sp>
-        <p:nvSpPr>
-          <p:cNvPr id="19" name="Text 17"/>
-          <p:cNvSpPr/>
-          <p:nvPr/>
-        </p:nvSpPr>
-        <p:spPr>
-          <a:xfrm>
-            <a:off x="777240" y="4434840"/>
-            <a:ext cx="10637215" cy="502920"/>
-          </a:xfrm>
-          <a:prstGeom prst="rect">
-            <a:avLst/>
-          </a:prstGeom>
-          <a:noFill/>
-          <a:ln/>
-        </p:spPr>
-        <p:txBody>
-          <a:bodyPr wrap="square" rtlCol="0" anchor="t"/>
-          <a:lstStyle/>
-          <a:p>
-            <a:pPr indent="0" marL="0">
-              <a:buNone/>
-            </a:pPr>
-            <a:r>
-              <a:rPr lang="en-US" sz="1100" dirty="0">
-                <a:solidFill>
-                  <a:srgbClr val="1E293B"/>
-                </a:solidFill>
-                <a:latin typeface="Calibri" pitchFamily="34" charset="0"/>
-                <a:ea typeface="Calibri" pitchFamily="34" charset="-122"/>
-                <a:cs typeface="Calibri" pitchFamily="34" charset="-120"/>
-              </a:rPr>
-              <a:t>При 671B: +0.058 F1 за 13 лейбъла, но −0.003 за 48 лейбъла (21.6% parse failures). При 8B: пренебрежим ефект (+0.007).</a:t>
-            </a:r>
-            <a:endParaRPr lang="en-US" sz="1100" dirty="0"/>
-          </a:p>
-        </p:txBody>
-      </p:sp>
-      <p:sp>
-        <p:nvSpPr>
-          <p:cNvPr id="20" name="Shape 18"/>
-          <p:cNvSpPr/>
-          <p:nvPr/>
-        </p:nvSpPr>
-        <p:spPr>
-          <a:xfrm>
-            <a:off x="548640" y="5120640"/>
-            <a:ext cx="11094415" cy="868680"/>
-          </a:xfrm>
-          <a:prstGeom prst="rect">
-            <a:avLst>
-              <a:gd name="adj" fmla="val 8421"/>
-            </a:avLst>
-          </a:prstGeom>
-          <a:solidFill>
-            <a:srgbClr val="FFFFFF"/>
-          </a:solidFill>
-          <a:ln/>
-          <a:effectLst>
-            <a:outerShdw sx="100000" sy="100000" kx="0" ky="0" algn="bl" rotWithShape="0" blurRad="50800" dist="25400" dir="16200000">
-              <a:srgbClr val="000000">
-                <a:alpha val="15000"/>
-              </a:srgbClr>
-            </a:outerShdw>
-          </a:effectLst>
-        </p:spPr>
-      </p:sp>
-      <p:sp>
-        <p:nvSpPr>
-          <p:cNvPr id="21" name="Shape 19"/>
-          <p:cNvSpPr/>
-          <p:nvPr/>
-        </p:nvSpPr>
-        <p:spPr>
-          <a:xfrm>
-            <a:off x="548640" y="5120640"/>
-            <a:ext cx="54864" cy="868680"/>
-          </a:xfrm>
-          <a:prstGeom prst="rect">
-            <a:avLst/>
-          </a:prstGeom>
-          <a:solidFill>
-            <a:srgbClr val="1B4965"/>
-          </a:solidFill>
-          <a:ln/>
-        </p:spPr>
-      </p:sp>
-      <p:sp>
-        <p:nvSpPr>
-          <p:cNvPr id="22" name="Text 20"/>
-          <p:cNvSpPr/>
-          <p:nvPr/>
-        </p:nvSpPr>
-        <p:spPr>
-          <a:xfrm>
-            <a:off x="777240" y="5166360"/>
-            <a:ext cx="3200400" cy="320040"/>
-          </a:xfrm>
-          <a:prstGeom prst="rect">
-            <a:avLst/>
-          </a:prstGeom>
-          <a:noFill/>
-          <a:ln/>
-        </p:spPr>
-        <p:txBody>
-          <a:bodyPr wrap="square" rtlCol="0" anchor="ctr"/>
-          <a:lstStyle/>
-          <a:p>
-            <a:pPr indent="0" marL="0">
-              <a:buNone/>
-            </a:pPr>
-            <a:r>
-              <a:rPr lang="en-US" sz="1400" b="1" dirty="0">
-                <a:solidFill>
-                  <a:srgbClr val="1B4965"/>
-                </a:solidFill>
-                <a:latin typeface="Georgia" pitchFamily="34" charset="0"/>
-                <a:ea typeface="Georgia" pitchFamily="34" charset="-122"/>
-                <a:cs typeface="Georgia" pitchFamily="34" charset="-120"/>
-              </a:rPr>
-              <a:t>Post-processing е критичен</a:t>
-            </a:r>
-            <a:endParaRPr lang="en-US" sz="1400" dirty="0"/>
-          </a:p>
-        </p:txBody>
-      </p:sp>
-      <p:sp>
-        <p:nvSpPr>
-          <p:cNvPr id="23" name="Text 21"/>
-          <p:cNvSpPr/>
-          <p:nvPr/>
-        </p:nvSpPr>
-        <p:spPr>
-          <a:xfrm>
-            <a:off x="777240" y="5440680"/>
-            <a:ext cx="10637215" cy="502920"/>
-          </a:xfrm>
-          <a:prstGeom prst="rect">
-            <a:avLst/>
-          </a:prstGeom>
-          <a:noFill/>
-          <a:ln/>
-        </p:spPr>
-        <p:txBody>
-          <a:bodyPr wrap="square" rtlCol="0" anchor="t"/>
-          <a:lstStyle/>
-          <a:p>
-            <a:pPr indent="0" marL="0">
-              <a:buNone/>
-            </a:pPr>
-            <a:r>
-              <a:rPr lang="en-US" sz="1100" dirty="0">
-                <a:solidFill>
-                  <a:srgbClr val="1E293B"/>
-                </a:solidFill>
-                <a:latin typeface="Calibri" pitchFamily="34" charset="0"/>
-                <a:ea typeface="Calibri" pitchFamily="34" charset="-122"/>
-                <a:cs typeface="Calibri" pitchFamily="34" charset="-120"/>
-              </a:rPr>
-              <a:t>Бъг в парсера маскира 43% от отговорите на Mistral Large 3 (0.312 → 0.658). Оценката на LLM изисква robust pipeline.</a:t>
-            </a:r>
-            <a:endParaRPr lang="en-US" sz="1100" dirty="0"/>
-          </a:p>
-        </p:txBody>
-      </p:sp>
-      <p:sp>
-        <p:nvSpPr>
-          <p:cNvPr id="24" name="Text 22"/>
-          <p:cNvSpPr/>
-          <p:nvPr/>
-        </p:nvSpPr>
-        <p:spPr>
-          <a:xfrm>
-            <a:off x="10820095" y="6446520"/>
-            <a:ext cx="1097280" cy="274320"/>
-          </a:xfrm>
-          <a:prstGeom prst="rect">
-            <a:avLst/>
-          </a:prstGeom>
-          <a:noFill/>
-          <a:ln/>
-        </p:spPr>
-        <p:txBody>
-          <a:bodyPr wrap="square" rtlCol="0" anchor="ctr"/>
-          <a:lstStyle/>
-          <a:p>
-            <a:pPr algn="r" indent="0" marL="0">
-              <a:buNone/>
-            </a:pPr>
-            <a:r>
-              <a:rPr lang="en-US" sz="1000" dirty="0">
-                <a:solidFill>
-                  <a:srgbClr val="64748B"/>
-                </a:solidFill>
-                <a:latin typeface="Calibri" pitchFamily="34" charset="0"/>
-                <a:ea typeface="Calibri" pitchFamily="34" charset="-122"/>
-                <a:cs typeface="Calibri" pitchFamily="34" charset="-120"/>
-              </a:rPr>
-              <a:t>12 / 13</a:t>
-            </a:r>
-            <a:endParaRPr lang="en-US" sz="1000" dirty="0"/>
-          </a:p>
-        </p:txBody>
-      </p:sp>
-    </p:spTree>
-  </p:cSld>
-  <p:clrMapOvr>
-    <a:masterClrMapping/>
-  </p:clrMapOvr>
-</p:sld>
-</file>
-
-<file path=ppt/slides/slide13.xml><?xml version="1.0" encoding="utf-8"?>
-<p:sld xmlns:a="http://schemas.openxmlformats.org/drawingml/2006/main" xmlns:r="http://schemas.openxmlformats.org/officeDocument/2006/relationships" xmlns:p="http://schemas.openxmlformats.org/presentationml/2006/main">
-  <p:cSld name="Slide 13">
     <p:bg>
       <p:bgPr>
         <a:solidFill>
@@ -5415,7 +4575,7 @@
                 <a:ea typeface="Calibri" pitchFamily="34" charset="-122"/>
                 <a:cs typeface="Calibri" pitchFamily="34" charset="-120"/>
               </a:rPr>
-              <a:t>2 / 13</a:t>
+              <a:t>2 / 12</a:t>
             </a:r>
             <a:endParaRPr lang="en-US" sz="1000" dirty="0"/>
           </a:p>
@@ -6075,7 +5235,7 @@
                 <a:ea typeface="Calibri" pitchFamily="34" charset="-122"/>
                 <a:cs typeface="Calibri" pitchFamily="34" charset="-120"/>
               </a:rPr>
-              <a:t>3 / 13</a:t>
+              <a:t>3 / 12</a:t>
             </a:r>
             <a:endParaRPr lang="en-US" sz="1000" dirty="0"/>
           </a:p>
@@ -6888,7 +6048,7 @@
                 <a:ea typeface="Calibri" pitchFamily="34" charset="-122"/>
                 <a:cs typeface="Calibri" pitchFamily="34" charset="-120"/>
               </a:rPr>
-              <a:t>4 / 13</a:t>
+              <a:t>4 / 12</a:t>
             </a:r>
             <a:endParaRPr lang="en-US" sz="1000" dirty="0"/>
           </a:p>
@@ -8671,7 +7831,7 @@
                 <a:ea typeface="Calibri" pitchFamily="34" charset="-122"/>
                 <a:cs typeface="Calibri" pitchFamily="34" charset="-120"/>
               </a:rPr>
-              <a:t>5 / 13</a:t>
+              <a:t>5 / 12</a:t>
             </a:r>
             <a:endParaRPr lang="en-US" sz="1000" dirty="0"/>
           </a:p>
@@ -8762,88 +7922,49 @@
                 <a:ea typeface="Georgia" pitchFamily="34" charset="-122"/>
                 <a:cs typeface="Georgia" pitchFamily="34" charset="-120"/>
               </a:rPr>
-              <a:t>Казус: Как бъг маскира представянето на модела</a:t>
+              <a:t>Сравнение на всички модели (13 категории)</a:t>
             </a:r>
             <a:endParaRPr lang="en-US" sz="2600" dirty="0"/>
           </a:p>
         </p:txBody>
       </p:sp>
-      <p:sp>
-        <p:nvSpPr>
-          <p:cNvPr id="4" name="Text 2"/>
-          <p:cNvSpPr/>
-          <p:nvPr/>
-        </p:nvSpPr>
-        <p:spPr>
-          <a:xfrm>
-            <a:off x="548640" y="1188720"/>
-            <a:ext cx="11094415" cy="822960"/>
-          </a:xfrm>
-          <a:prstGeom prst="rect">
-            <a:avLst/>
-          </a:prstGeom>
-          <a:noFill/>
-          <a:ln/>
-        </p:spPr>
-        <p:txBody>
-          <a:bodyPr wrap="square" rtlCol="0" anchor="ctr"/>
-          <a:lstStyle/>
-          <a:p>
-            <a:pPr indent="0" marL="0">
-              <a:lnSpc>
-                <a:spcPct val="130000"/>
-              </a:lnSpc>
-              <a:buNone/>
-            </a:pPr>
-            <a:r>
-              <a:rPr lang="en-US" sz="1500" dirty="0">
-                <a:solidFill>
-                  <a:srgbClr val="1E293B"/>
-                </a:solidFill>
-                <a:latin typeface="Calibri" pitchFamily="34" charset="0"/>
-                <a:ea typeface="Calibri" pitchFamily="34" charset="-122"/>
-                <a:cs typeface="Calibri" pitchFamily="34" charset="-120"/>
-              </a:rPr>
-              <a:t>Mistral Large 3 (675B) първоначално показа Macro-F1 = 0.312 при zero-shot.</a:t>
-            </a:r>
-            <a:endParaRPr lang="en-US" sz="1500" dirty="0"/>
-          </a:p>
-          <a:p>
-            <a:pPr indent="0" marL="0">
-              <a:lnSpc>
-                <a:spcPct val="130000"/>
-              </a:lnSpc>
-              <a:buNone/>
-            </a:pPr>
-            <a:r>
-              <a:rPr lang="en-US" sz="1500" dirty="0">
-                <a:solidFill>
-                  <a:srgbClr val="1E293B"/>
-                </a:solidFill>
-                <a:latin typeface="Calibri" pitchFamily="34" charset="0"/>
-                <a:ea typeface="Calibri" pitchFamily="34" charset="-122"/>
-                <a:cs typeface="Calibri" pitchFamily="34" charset="-120"/>
-              </a:rPr>
-              <a:t>Проблемът: парсерът за нормализация отхвърляше 43% от отговорите.</a:t>
-            </a:r>
-            <a:endParaRPr lang="en-US" sz="1500" dirty="0"/>
-          </a:p>
-        </p:txBody>
-      </p:sp>
-      <p:sp>
-        <p:nvSpPr>
-          <p:cNvPr id="5" name="Shape 3"/>
-          <p:cNvSpPr/>
-          <p:nvPr/>
-        </p:nvSpPr>
-        <p:spPr>
-          <a:xfrm>
-            <a:off x="1371600" y="2377440"/>
-            <a:ext cx="4114800" cy="2560320"/>
+      <p:pic>
+        <p:nvPicPr>
+          <p:cNvPr id="4" name="Image 0" descr="preencoded.png">    </p:cNvPr>
+          <p:cNvPicPr>
+            <a:picLocks noChangeAspect="1"/>
+          </p:cNvPicPr>
+          <p:nvPr/>
+        </p:nvPicPr>
+        <p:blipFill>
+          <a:blip r:embed="rId1"/>
+          <a:srcRect l="0" r="0" t="0" b="0"/>
+          <a:stretch/>
+        </p:blipFill>
+        <p:spPr>
+          <a:xfrm>
+            <a:off x="548640" y="1005840"/>
+            <a:ext cx="11094415" cy="4572000"/>
+          </a:xfrm>
+          <a:prstGeom prst="rect">
+            <a:avLst/>
+          </a:prstGeom>
+        </p:spPr>
+      </p:pic>
+      <p:sp>
+        <p:nvSpPr>
+          <p:cNvPr id="5" name="Shape 2"/>
+          <p:cNvSpPr/>
+          <p:nvPr/>
+        </p:nvSpPr>
+        <p:spPr>
+          <a:xfrm>
+            <a:off x="548640" y="5669280"/>
+            <a:ext cx="11094415" cy="640080"/>
           </a:xfrm>
           <a:prstGeom prst="rect">
             <a:avLst>
-              <a:gd name="adj" fmla="val 3571"/>
+              <a:gd name="adj" fmla="val 11429"/>
             </a:avLst>
           </a:prstGeom>
           <a:solidFill>
@@ -8861,34 +7982,14 @@
       </p:sp>
       <p:sp>
         <p:nvSpPr>
-          <p:cNvPr id="6" name="Shape 4"/>
-          <p:cNvSpPr/>
-          <p:nvPr/>
-        </p:nvSpPr>
-        <p:spPr>
-          <a:xfrm>
-            <a:off x="1371600" y="2377440"/>
-            <a:ext cx="4114800" cy="54864"/>
-          </a:xfrm>
-          <a:prstGeom prst="rect">
-            <a:avLst/>
-          </a:prstGeom>
-          <a:solidFill>
-            <a:srgbClr val="D62728"/>
-          </a:solidFill>
-          <a:ln/>
-        </p:spPr>
-      </p:sp>
-      <p:sp>
-        <p:nvSpPr>
-          <p:cNvPr id="7" name="Text 5"/>
-          <p:cNvSpPr/>
-          <p:nvPr/>
-        </p:nvSpPr>
-        <p:spPr>
-          <a:xfrm>
-            <a:off x="1371600" y="2514600"/>
-            <a:ext cx="4114800" cy="365760"/>
+          <p:cNvPr id="6" name="Text 3"/>
+          <p:cNvSpPr/>
+          <p:nvPr/>
+        </p:nvSpPr>
+        <p:spPr>
+          <a:xfrm>
+            <a:off x="731520" y="5715000"/>
+            <a:ext cx="10728655" cy="548640"/>
           </a:xfrm>
           <a:prstGeom prst="rect">
             <a:avLst/>
@@ -8904,496 +8005,6 @@
               <a:buNone/>
             </a:pPr>
             <a:r>
-              <a:rPr lang="en-US" sz="1400" b="1" dirty="0">
-                <a:solidFill>
-                  <a:srgbClr val="D62728"/>
-                </a:solidFill>
-                <a:latin typeface="Georgia" pitchFamily="34" charset="0"/>
-                <a:ea typeface="Georgia" pitchFamily="34" charset="-122"/>
-                <a:cs typeface="Georgia" pitchFamily="34" charset="-120"/>
-              </a:rPr>
-              <a:t>ПРЕДИ (бъг)</a:t>
-            </a:r>
-            <a:endParaRPr lang="en-US" sz="1400" dirty="0"/>
-          </a:p>
-        </p:txBody>
-      </p:sp>
-      <p:sp>
-        <p:nvSpPr>
-          <p:cNvPr id="8" name="Text 6"/>
-          <p:cNvSpPr/>
-          <p:nvPr/>
-        </p:nvSpPr>
-        <p:spPr>
-          <a:xfrm>
-            <a:off x="1371600" y="2926080"/>
-            <a:ext cx="4114800" cy="731520"/>
-          </a:xfrm>
-          <a:prstGeom prst="rect">
-            <a:avLst/>
-          </a:prstGeom>
-          <a:noFill/>
-          <a:ln/>
-        </p:spPr>
-        <p:txBody>
-          <a:bodyPr wrap="square" rtlCol="0" anchor="ctr"/>
-          <a:lstStyle/>
-          <a:p>
-            <a:pPr algn="ctr" indent="0" marL="0">
-              <a:buNone/>
-            </a:pPr>
-            <a:r>
-              <a:rPr lang="en-US" sz="4800" b="1" dirty="0">
-                <a:solidFill>
-                  <a:srgbClr val="D62728"/>
-                </a:solidFill>
-                <a:latin typeface="Consolas" pitchFamily="34" charset="0"/>
-                <a:ea typeface="Consolas" pitchFamily="34" charset="-122"/>
-                <a:cs typeface="Consolas" pitchFamily="34" charset="-120"/>
-              </a:rPr>
-              <a:t>0.312</a:t>
-            </a:r>
-            <a:endParaRPr lang="en-US" sz="4800" dirty="0"/>
-          </a:p>
-        </p:txBody>
-      </p:sp>
-      <p:sp>
-        <p:nvSpPr>
-          <p:cNvPr id="9" name="Text 7"/>
-          <p:cNvSpPr/>
-          <p:nvPr/>
-        </p:nvSpPr>
-        <p:spPr>
-          <a:xfrm>
-            <a:off x="1371600" y="3657600"/>
-            <a:ext cx="4114800" cy="320040"/>
-          </a:xfrm>
-          <a:prstGeom prst="rect">
-            <a:avLst/>
-          </a:prstGeom>
-          <a:noFill/>
-          <a:ln/>
-        </p:spPr>
-        <p:txBody>
-          <a:bodyPr wrap="square" rtlCol="0" anchor="ctr"/>
-          <a:lstStyle/>
-          <a:p>
-            <a:pPr algn="ctr" indent="0" marL="0">
-              <a:buNone/>
-            </a:pPr>
-            <a:r>
-              <a:rPr lang="en-US" sz="1400" dirty="0">
-                <a:solidFill>
-                  <a:srgbClr val="64748B"/>
-                </a:solidFill>
-                <a:latin typeface="Calibri" pitchFamily="34" charset="0"/>
-                <a:ea typeface="Calibri" pitchFamily="34" charset="-122"/>
-                <a:cs typeface="Calibri" pitchFamily="34" charset="-120"/>
-              </a:rPr>
-              <a:t>Macro-F1</a:t>
-            </a:r>
-            <a:endParaRPr lang="en-US" sz="1400" dirty="0"/>
-          </a:p>
-        </p:txBody>
-      </p:sp>
-      <p:sp>
-        <p:nvSpPr>
-          <p:cNvPr id="10" name="Text 8"/>
-          <p:cNvSpPr/>
-          <p:nvPr/>
-        </p:nvSpPr>
-        <p:spPr>
-          <a:xfrm>
-            <a:off x="1554480" y="4023360"/>
-            <a:ext cx="3749040" cy="731520"/>
-          </a:xfrm>
-          <a:prstGeom prst="rect">
-            <a:avLst/>
-          </a:prstGeom>
-          <a:noFill/>
-          <a:ln/>
-        </p:spPr>
-        <p:txBody>
-          <a:bodyPr wrap="square" rtlCol="0" anchor="ctr"/>
-          <a:lstStyle/>
-          <a:p>
-            <a:pPr algn="ctr" indent="0" marL="0">
-              <a:buNone/>
-            </a:pPr>
-            <a:r>
-              <a:rPr lang="en-US" sz="1100" dirty="0">
-                <a:solidFill>
-                  <a:srgbClr val="64748B"/>
-                </a:solidFill>
-                <a:latin typeface="Calibri" pitchFamily="34" charset="0"/>
-                <a:ea typeface="Calibri" pitchFamily="34" charset="-122"/>
-                <a:cs typeface="Calibri" pitchFamily="34" charset="-120"/>
-              </a:rPr>
-              <a:t>43% parse failures</a:t>
-            </a:r>
-            <a:endParaRPr lang="en-US" sz="1100" dirty="0"/>
-          </a:p>
-          <a:p>
-            <a:pPr algn="ctr" indent="0" marL="0">
-              <a:buNone/>
-            </a:pPr>
-            <a:r>
-              <a:rPr lang="en-US" sz="1100" dirty="0">
-                <a:solidFill>
-                  <a:srgbClr val="64748B"/>
-                </a:solidFill>
-                <a:latin typeface="Calibri" pitchFamily="34" charset="0"/>
-                <a:ea typeface="Calibri" pitchFamily="34" charset="-122"/>
-                <a:cs typeface="Calibri" pitchFamily="34" charset="-120"/>
-              </a:rPr>
-              <a:t>_normalize() не разпознава</a:t>
-            </a:r>
-            <a:endParaRPr lang="en-US" sz="1100" dirty="0"/>
-          </a:p>
-          <a:p>
-            <a:pPr algn="ctr" indent="0" marL="0">
-              <a:buNone/>
-            </a:pPr>
-            <a:r>
-              <a:rPr lang="en-US" sz="1100" dirty="0">
-                <a:solidFill>
-                  <a:srgbClr val="64748B"/>
-                </a:solidFill>
-                <a:latin typeface="Calibri" pitchFamily="34" charset="0"/>
-                <a:ea typeface="Calibri" pitchFamily="34" charset="-122"/>
-                <a:cs typeface="Calibri" pitchFamily="34" charset="-120"/>
-              </a:rPr>
-              <a:t>"Category: Subcategory" формат</a:t>
-            </a:r>
-            <a:endParaRPr lang="en-US" sz="1100" dirty="0"/>
-          </a:p>
-        </p:txBody>
-      </p:sp>
-      <p:sp>
-        <p:nvSpPr>
-          <p:cNvPr id="11" name="Text 9"/>
-          <p:cNvSpPr/>
-          <p:nvPr/>
-        </p:nvSpPr>
-        <p:spPr>
-          <a:xfrm>
-            <a:off x="5577840" y="3017520"/>
-            <a:ext cx="1005840" cy="731520"/>
-          </a:xfrm>
-          <a:prstGeom prst="rect">
-            <a:avLst/>
-          </a:prstGeom>
-          <a:noFill/>
-          <a:ln/>
-        </p:spPr>
-        <p:txBody>
-          <a:bodyPr wrap="square" rtlCol="0" anchor="ctr"/>
-          <a:lstStyle/>
-          <a:p>
-            <a:pPr algn="ctr" indent="0" marL="0">
-              <a:buNone/>
-            </a:pPr>
-            <a:r>
-              <a:rPr lang="en-US" sz="4800" b="1" dirty="0">
-                <a:solidFill>
-                  <a:srgbClr val="5FA8D3"/>
-                </a:solidFill>
-                <a:latin typeface="Calibri" pitchFamily="34" charset="0"/>
-                <a:ea typeface="Calibri" pitchFamily="34" charset="-122"/>
-                <a:cs typeface="Calibri" pitchFamily="34" charset="-120"/>
-              </a:rPr>
-              <a:t>➜</a:t>
-            </a:r>
-            <a:endParaRPr lang="en-US" sz="4800" dirty="0"/>
-          </a:p>
-        </p:txBody>
-      </p:sp>
-      <p:sp>
-        <p:nvSpPr>
-          <p:cNvPr id="12" name="Shape 10"/>
-          <p:cNvSpPr/>
-          <p:nvPr/>
-        </p:nvSpPr>
-        <p:spPr>
-          <a:xfrm>
-            <a:off x="6675120" y="2377440"/>
-            <a:ext cx="4114800" cy="2560320"/>
-          </a:xfrm>
-          <a:prstGeom prst="rect">
-            <a:avLst>
-              <a:gd name="adj" fmla="val 3571"/>
-            </a:avLst>
-          </a:prstGeom>
-          <a:solidFill>
-            <a:srgbClr val="FFFFFF"/>
-          </a:solidFill>
-          <a:ln/>
-          <a:effectLst>
-            <a:outerShdw sx="100000" sy="100000" kx="0" ky="0" algn="bl" rotWithShape="0" blurRad="50800" dist="25400" dir="16200000">
-              <a:srgbClr val="000000">
-                <a:alpha val="15000"/>
-              </a:srgbClr>
-            </a:outerShdw>
-          </a:effectLst>
-        </p:spPr>
-      </p:sp>
-      <p:sp>
-        <p:nvSpPr>
-          <p:cNvPr id="13" name="Shape 11"/>
-          <p:cNvSpPr/>
-          <p:nvPr/>
-        </p:nvSpPr>
-        <p:spPr>
-          <a:xfrm>
-            <a:off x="6675120" y="2377440"/>
-            <a:ext cx="4114800" cy="54864"/>
-          </a:xfrm>
-          <a:prstGeom prst="rect">
-            <a:avLst/>
-          </a:prstGeom>
-          <a:solidFill>
-            <a:srgbClr val="2CA02C"/>
-          </a:solidFill>
-          <a:ln/>
-        </p:spPr>
-      </p:sp>
-      <p:sp>
-        <p:nvSpPr>
-          <p:cNvPr id="14" name="Text 12"/>
-          <p:cNvSpPr/>
-          <p:nvPr/>
-        </p:nvSpPr>
-        <p:spPr>
-          <a:xfrm>
-            <a:off x="6675120" y="2514600"/>
-            <a:ext cx="4114800" cy="365760"/>
-          </a:xfrm>
-          <a:prstGeom prst="rect">
-            <a:avLst/>
-          </a:prstGeom>
-          <a:noFill/>
-          <a:ln/>
-        </p:spPr>
-        <p:txBody>
-          <a:bodyPr wrap="square" rtlCol="0" anchor="ctr"/>
-          <a:lstStyle/>
-          <a:p>
-            <a:pPr algn="ctr" indent="0" marL="0">
-              <a:buNone/>
-            </a:pPr>
-            <a:r>
-              <a:rPr lang="en-US" sz="1400" b="1" dirty="0">
-                <a:solidFill>
-                  <a:srgbClr val="2CA02C"/>
-                </a:solidFill>
-                <a:latin typeface="Georgia" pitchFamily="34" charset="0"/>
-                <a:ea typeface="Georgia" pitchFamily="34" charset="-122"/>
-                <a:cs typeface="Georgia" pitchFamily="34" charset="-120"/>
-              </a:rPr>
-              <a:t>СЛЕД (поправка)</a:t>
-            </a:r>
-            <a:endParaRPr lang="en-US" sz="1400" dirty="0"/>
-          </a:p>
-        </p:txBody>
-      </p:sp>
-      <p:sp>
-        <p:nvSpPr>
-          <p:cNvPr id="15" name="Text 13"/>
-          <p:cNvSpPr/>
-          <p:nvPr/>
-        </p:nvSpPr>
-        <p:spPr>
-          <a:xfrm>
-            <a:off x="6675120" y="2926080"/>
-            <a:ext cx="4114800" cy="731520"/>
-          </a:xfrm>
-          <a:prstGeom prst="rect">
-            <a:avLst/>
-          </a:prstGeom>
-          <a:noFill/>
-          <a:ln/>
-        </p:spPr>
-        <p:txBody>
-          <a:bodyPr wrap="square" rtlCol="0" anchor="ctr"/>
-          <a:lstStyle/>
-          <a:p>
-            <a:pPr algn="ctr" indent="0" marL="0">
-              <a:buNone/>
-            </a:pPr>
-            <a:r>
-              <a:rPr lang="en-US" sz="4800" b="1" dirty="0">
-                <a:solidFill>
-                  <a:srgbClr val="2CA02C"/>
-                </a:solidFill>
-                <a:latin typeface="Consolas" pitchFamily="34" charset="0"/>
-                <a:ea typeface="Consolas" pitchFamily="34" charset="-122"/>
-                <a:cs typeface="Consolas" pitchFamily="34" charset="-120"/>
-              </a:rPr>
-              <a:t>0.658</a:t>
-            </a:r>
-            <a:endParaRPr lang="en-US" sz="4800" dirty="0"/>
-          </a:p>
-        </p:txBody>
-      </p:sp>
-      <p:sp>
-        <p:nvSpPr>
-          <p:cNvPr id="16" name="Text 14"/>
-          <p:cNvSpPr/>
-          <p:nvPr/>
-        </p:nvSpPr>
-        <p:spPr>
-          <a:xfrm>
-            <a:off x="6675120" y="3657600"/>
-            <a:ext cx="4114800" cy="320040"/>
-          </a:xfrm>
-          <a:prstGeom prst="rect">
-            <a:avLst/>
-          </a:prstGeom>
-          <a:noFill/>
-          <a:ln/>
-        </p:spPr>
-        <p:txBody>
-          <a:bodyPr wrap="square" rtlCol="0" anchor="ctr"/>
-          <a:lstStyle/>
-          <a:p>
-            <a:pPr algn="ctr" indent="0" marL="0">
-              <a:buNone/>
-            </a:pPr>
-            <a:r>
-              <a:rPr lang="en-US" sz="1400" dirty="0">
-                <a:solidFill>
-                  <a:srgbClr val="64748B"/>
-                </a:solidFill>
-                <a:latin typeface="Calibri" pitchFamily="34" charset="0"/>
-                <a:ea typeface="Calibri" pitchFamily="34" charset="-122"/>
-                <a:cs typeface="Calibri" pitchFamily="34" charset="-120"/>
-              </a:rPr>
-              <a:t>Macro-F1</a:t>
-            </a:r>
-            <a:endParaRPr lang="en-US" sz="1400" dirty="0"/>
-          </a:p>
-        </p:txBody>
-      </p:sp>
-      <p:sp>
-        <p:nvSpPr>
-          <p:cNvPr id="17" name="Text 15"/>
-          <p:cNvSpPr/>
-          <p:nvPr/>
-        </p:nvSpPr>
-        <p:spPr>
-          <a:xfrm>
-            <a:off x="6858000" y="4023360"/>
-            <a:ext cx="3749040" cy="731520"/>
-          </a:xfrm>
-          <a:prstGeom prst="rect">
-            <a:avLst/>
-          </a:prstGeom>
-          <a:noFill/>
-          <a:ln/>
-        </p:spPr>
-        <p:txBody>
-          <a:bodyPr wrap="square" rtlCol="0" anchor="ctr"/>
-          <a:lstStyle/>
-          <a:p>
-            <a:pPr algn="ctr" indent="0" marL="0">
-              <a:buNone/>
-            </a:pPr>
-            <a:r>
-              <a:rPr lang="en-US" sz="1100" dirty="0">
-                <a:solidFill>
-                  <a:srgbClr val="64748B"/>
-                </a:solidFill>
-                <a:latin typeface="Calibri" pitchFamily="34" charset="0"/>
-                <a:ea typeface="Calibri" pitchFamily="34" charset="-122"/>
-                <a:cs typeface="Calibri" pitchFamily="34" charset="-120"/>
-              </a:rPr>
-              <a:t>0% parse failures</a:t>
-            </a:r>
-            <a:endParaRPr lang="en-US" sz="1100" dirty="0"/>
-          </a:p>
-          <a:p>
-            <a:pPr algn="ctr" indent="0" marL="0">
-              <a:buNone/>
-            </a:pPr>
-            <a:r>
-              <a:rPr lang="en-US" sz="1100" dirty="0">
-                <a:solidFill>
-                  <a:srgbClr val="64748B"/>
-                </a:solidFill>
-                <a:latin typeface="Calibri" pitchFamily="34" charset="0"/>
-                <a:ea typeface="Calibri" pitchFamily="34" charset="-122"/>
-                <a:cs typeface="Calibri" pitchFamily="34" charset="-120"/>
-              </a:rPr>
-              <a:t>colon-prefix stripping</a:t>
-            </a:r>
-            <a:endParaRPr lang="en-US" sz="1100" dirty="0"/>
-          </a:p>
-          <a:p>
-            <a:pPr algn="ctr" indent="0" marL="0">
-              <a:buNone/>
-            </a:pPr>
-            <a:r>
-              <a:rPr lang="en-US" sz="1100" dirty="0">
-                <a:solidFill>
-                  <a:srgbClr val="64748B"/>
-                </a:solidFill>
-                <a:latin typeface="Calibri" pitchFamily="34" charset="0"/>
-                <a:ea typeface="Calibri" pitchFamily="34" charset="-122"/>
-                <a:cs typeface="Calibri" pitchFamily="34" charset="-120"/>
-              </a:rPr>
-              <a:t>преди exact match</a:t>
-            </a:r>
-            <a:endParaRPr lang="en-US" sz="1100" dirty="0"/>
-          </a:p>
-        </p:txBody>
-      </p:sp>
-      <p:sp>
-        <p:nvSpPr>
-          <p:cNvPr id="18" name="Shape 16"/>
-          <p:cNvSpPr/>
-          <p:nvPr/>
-        </p:nvSpPr>
-        <p:spPr>
-          <a:xfrm>
-            <a:off x="1371600" y="5303520"/>
-            <a:ext cx="9448495" cy="731520"/>
-          </a:xfrm>
-          <a:prstGeom prst="rect">
-            <a:avLst>
-              <a:gd name="adj" fmla="val 10000"/>
-            </a:avLst>
-          </a:prstGeom>
-          <a:solidFill>
-            <a:srgbClr val="FFF3CD"/>
-          </a:solidFill>
-          <a:ln/>
-        </p:spPr>
-      </p:sp>
-      <p:sp>
-        <p:nvSpPr>
-          <p:cNvPr id="19" name="Text 17"/>
-          <p:cNvSpPr/>
-          <p:nvPr/>
-        </p:nvSpPr>
-        <p:spPr>
-          <a:xfrm>
-            <a:off x="1554480" y="5349240"/>
-            <a:ext cx="9082735" cy="640080"/>
-          </a:xfrm>
-          <a:prstGeom prst="rect">
-            <a:avLst/>
-          </a:prstGeom>
-          <a:noFill/>
-          <a:ln/>
-        </p:spPr>
-        <p:txBody>
-          <a:bodyPr wrap="square" rtlCol="0" anchor="ctr"/>
-          <a:lstStyle/>
-          <a:p>
-            <a:pPr indent="0" marL="0">
-              <a:buNone/>
-            </a:pPr>
-            <a:r>
               <a:rPr lang="en-US" sz="1300" dirty="0">
                 <a:solidFill>
                   <a:srgbClr val="1E293B"/>
@@ -9402,7 +8013,7 @@
                 <a:ea typeface="Calibri" pitchFamily="34" charset="-122"/>
                 <a:cs typeface="Calibri" pitchFamily="34" charset="-120"/>
               </a:rPr>
-              <a:t>⚠  Урок: Оценката на LLM зависи критично от качеството на post-processing pipeline. Бъг в парсера може да маскира реалното представяне.</a:t>
+              <a:t>Classic ML (Macro-F1 0.691) &gt; DeepSeek V3.2 + Thinking (0.681) &gt; Mistral Large 3 (0.658) &gt; Qwen3-8B Fine-Tuned (0.510)</a:t>
             </a:r>
             <a:endParaRPr lang="en-US" sz="1300" dirty="0"/>
           </a:p>
@@ -9410,7 +8021,7 @@
       </p:sp>
       <p:sp>
         <p:nvSpPr>
-          <p:cNvPr id="20" name="Text 18"/>
+          <p:cNvPr id="7" name="Text 4"/>
           <p:cNvSpPr/>
           <p:nvPr/>
         </p:nvSpPr>
@@ -9441,7 +8052,7 @@
                 <a:ea typeface="Calibri" pitchFamily="34" charset="-122"/>
                 <a:cs typeface="Calibri" pitchFamily="34" charset="-120"/>
               </a:rPr>
-              <a:t>6 / 13</a:t>
+              <a:t>6 / 12</a:t>
             </a:r>
             <a:endParaRPr lang="en-US" sz="1000" dirty="0"/>
           </a:p>
@@ -9532,7 +8143,7 @@
                 <a:ea typeface="Georgia" pitchFamily="34" charset="-122"/>
                 <a:cs typeface="Georgia" pitchFamily="34" charset="-120"/>
               </a:rPr>
-              <a:t>Сравнение на всички модели (13 категории)</a:t>
+              <a:t>Най-добър модел по подход</a:t>
             </a:r>
             <a:endParaRPr lang="en-US" sz="2600" dirty="0"/>
           </a:p>
@@ -9554,7 +8165,7 @@
         <p:spPr>
           <a:xfrm>
             <a:off x="548640" y="1005840"/>
-            <a:ext cx="11094415" cy="4572000"/>
+            <a:ext cx="11094415" cy="4206240"/>
           </a:xfrm>
           <a:prstGeom prst="rect">
             <a:avLst/>
@@ -9569,12 +8180,12 @@
         </p:nvSpPr>
         <p:spPr>
           <a:xfrm>
-            <a:off x="548640" y="5669280"/>
-            <a:ext cx="11094415" cy="640080"/>
+            <a:off x="700888" y="5394960"/>
+            <a:ext cx="2560320" cy="914400"/>
           </a:xfrm>
           <a:prstGeom prst="rect">
             <a:avLst>
-              <a:gd name="adj" fmla="val 11429"/>
+              <a:gd name="adj" fmla="val 8000"/>
             </a:avLst>
           </a:prstGeom>
           <a:solidFill>
@@ -9592,14 +8203,34 @@
       </p:sp>
       <p:sp>
         <p:nvSpPr>
-          <p:cNvPr id="6" name="Text 3"/>
-          <p:cNvSpPr/>
-          <p:nvPr/>
-        </p:nvSpPr>
-        <p:spPr>
-          <a:xfrm>
-            <a:off x="731520" y="5715000"/>
-            <a:ext cx="10728655" cy="548640"/>
+          <p:cNvPr id="6" name="Shape 3"/>
+          <p:cNvSpPr/>
+          <p:nvPr/>
+        </p:nvSpPr>
+        <p:spPr>
+          <a:xfrm>
+            <a:off x="700888" y="5394960"/>
+            <a:ext cx="2560320" cy="45720"/>
+          </a:xfrm>
+          <a:prstGeom prst="rect">
+            <a:avLst/>
+          </a:prstGeom>
+          <a:solidFill>
+            <a:srgbClr val="1F77B4"/>
+          </a:solidFill>
+          <a:ln/>
+        </p:spPr>
+      </p:sp>
+      <p:sp>
+        <p:nvSpPr>
+          <p:cNvPr id="7" name="Text 4"/>
+          <p:cNvSpPr/>
+          <p:nvPr/>
+        </p:nvSpPr>
+        <p:spPr>
+          <a:xfrm>
+            <a:off x="700888" y="5468112"/>
+            <a:ext cx="2560320" cy="274320"/>
           </a:xfrm>
           <a:prstGeom prst="rect">
             <a:avLst/>
@@ -9615,7 +8246,46 @@
               <a:buNone/>
             </a:pPr>
             <a:r>
-              <a:rPr lang="en-US" sz="1300" dirty="0">
+              <a:rPr lang="en-US" sz="1100" b="1" dirty="0">
+                <a:solidFill>
+                  <a:srgbClr val="1F77B4"/>
+                </a:solidFill>
+                <a:latin typeface="Georgia" pitchFamily="34" charset="0"/>
+                <a:ea typeface="Georgia" pitchFamily="34" charset="-122"/>
+                <a:cs typeface="Georgia" pitchFamily="34" charset="-120"/>
+              </a:rPr>
+              <a:t>Zero-Shot</a:t>
+            </a:r>
+            <a:endParaRPr lang="en-US" sz="1100" dirty="0"/>
+          </a:p>
+        </p:txBody>
+      </p:sp>
+      <p:sp>
+        <p:nvSpPr>
+          <p:cNvPr id="8" name="Text 5"/>
+          <p:cNvSpPr/>
+          <p:nvPr/>
+        </p:nvSpPr>
+        <p:spPr>
+          <a:xfrm>
+            <a:off x="792328" y="5742432"/>
+            <a:ext cx="2377440" cy="502920"/>
+          </a:xfrm>
+          <a:prstGeom prst="rect">
+            <a:avLst/>
+          </a:prstGeom>
+          <a:noFill/>
+          <a:ln/>
+        </p:spPr>
+        <p:txBody>
+          <a:bodyPr wrap="square" rtlCol="0" anchor="ctr"/>
+          <a:lstStyle/>
+          <a:p>
+            <a:pPr algn="ctr" indent="0" marL="0">
+              <a:buNone/>
+            </a:pPr>
+            <a:r>
+              <a:rPr lang="en-US" sz="1000" dirty="0">
                 <a:solidFill>
                   <a:srgbClr val="1E293B"/>
                 </a:solidFill>
@@ -9623,15 +8293,464 @@
                 <a:ea typeface="Calibri" pitchFamily="34" charset="-122"/>
                 <a:cs typeface="Calibri" pitchFamily="34" charset="-120"/>
               </a:rPr>
-              <a:t>Classic ML (Macro-F1 0.691) &gt; DeepSeek V3.2 + Thinking (0.681) &gt; Mistral Large 3 (0.658) &gt; Qwen3-8B Fine-Tuned (0.510)</a:t>
-            </a:r>
-            <a:endParaRPr lang="en-US" sz="1300" dirty="0"/>
-          </a:p>
-        </p:txBody>
-      </p:sp>
-      <p:sp>
-        <p:nvSpPr>
-          <p:cNvPr id="7" name="Text 4"/>
+              <a:t>Mistral Large 3</a:t>
+            </a:r>
+            <a:endParaRPr lang="en-US" sz="1000" dirty="0"/>
+          </a:p>
+          <a:p>
+            <a:pPr algn="ctr" indent="0" marL="0">
+              <a:buNone/>
+            </a:pPr>
+            <a:r>
+              <a:rPr lang="en-US" sz="1000" dirty="0">
+                <a:solidFill>
+                  <a:srgbClr val="1E293B"/>
+                </a:solidFill>
+                <a:latin typeface="Calibri" pitchFamily="34" charset="0"/>
+                <a:ea typeface="Calibri" pitchFamily="34" charset="-122"/>
+                <a:cs typeface="Calibri" pitchFamily="34" charset="-120"/>
+              </a:rPr>
+              <a:t>Macro-F1: 0.658</a:t>
+            </a:r>
+            <a:endParaRPr lang="en-US" sz="1000" dirty="0"/>
+          </a:p>
+        </p:txBody>
+      </p:sp>
+      <p:sp>
+        <p:nvSpPr>
+          <p:cNvPr id="9" name="Shape 6"/>
+          <p:cNvSpPr/>
+          <p:nvPr/>
+        </p:nvSpPr>
+        <p:spPr>
+          <a:xfrm>
+            <a:off x="3444088" y="5394960"/>
+            <a:ext cx="2560320" cy="914400"/>
+          </a:xfrm>
+          <a:prstGeom prst="rect">
+            <a:avLst>
+              <a:gd name="adj" fmla="val 8000"/>
+            </a:avLst>
+          </a:prstGeom>
+          <a:solidFill>
+            <a:srgbClr val="FFFFFF"/>
+          </a:solidFill>
+          <a:ln/>
+          <a:effectLst>
+            <a:outerShdw sx="100000" sy="100000" kx="0" ky="0" algn="bl" rotWithShape="0" blurRad="50800" dist="25400" dir="16200000">
+              <a:srgbClr val="000000">
+                <a:alpha val="15000"/>
+              </a:srgbClr>
+            </a:outerShdw>
+          </a:effectLst>
+        </p:spPr>
+      </p:sp>
+      <p:sp>
+        <p:nvSpPr>
+          <p:cNvPr id="10" name="Shape 7"/>
+          <p:cNvSpPr/>
+          <p:nvPr/>
+        </p:nvSpPr>
+        <p:spPr>
+          <a:xfrm>
+            <a:off x="3444088" y="5394960"/>
+            <a:ext cx="2560320" cy="45720"/>
+          </a:xfrm>
+          <a:prstGeom prst="rect">
+            <a:avLst/>
+          </a:prstGeom>
+          <a:solidFill>
+            <a:srgbClr val="FF7F0E"/>
+          </a:solidFill>
+          <a:ln/>
+        </p:spPr>
+      </p:sp>
+      <p:sp>
+        <p:nvSpPr>
+          <p:cNvPr id="11" name="Text 8"/>
+          <p:cNvSpPr/>
+          <p:nvPr/>
+        </p:nvSpPr>
+        <p:spPr>
+          <a:xfrm>
+            <a:off x="3444088" y="5468112"/>
+            <a:ext cx="2560320" cy="274320"/>
+          </a:xfrm>
+          <a:prstGeom prst="rect">
+            <a:avLst/>
+          </a:prstGeom>
+          <a:noFill/>
+          <a:ln/>
+        </p:spPr>
+        <p:txBody>
+          <a:bodyPr wrap="square" rtlCol="0" anchor="ctr"/>
+          <a:lstStyle/>
+          <a:p>
+            <a:pPr algn="ctr" indent="0" marL="0">
+              <a:buNone/>
+            </a:pPr>
+            <a:r>
+              <a:rPr lang="en-US" sz="1100" b="1" dirty="0">
+                <a:solidFill>
+                  <a:srgbClr val="FF7F0E"/>
+                </a:solidFill>
+                <a:latin typeface="Georgia" pitchFamily="34" charset="0"/>
+                <a:ea typeface="Georgia" pitchFamily="34" charset="-122"/>
+                <a:cs typeface="Georgia" pitchFamily="34" charset="-120"/>
+              </a:rPr>
+              <a:t>Few-Shot</a:t>
+            </a:r>
+            <a:endParaRPr lang="en-US" sz="1100" dirty="0"/>
+          </a:p>
+        </p:txBody>
+      </p:sp>
+      <p:sp>
+        <p:nvSpPr>
+          <p:cNvPr id="12" name="Text 9"/>
+          <p:cNvSpPr/>
+          <p:nvPr/>
+        </p:nvSpPr>
+        <p:spPr>
+          <a:xfrm>
+            <a:off x="3535528" y="5742432"/>
+            <a:ext cx="2377440" cy="502920"/>
+          </a:xfrm>
+          <a:prstGeom prst="rect">
+            <a:avLst/>
+          </a:prstGeom>
+          <a:noFill/>
+          <a:ln/>
+        </p:spPr>
+        <p:txBody>
+          <a:bodyPr wrap="square" rtlCol="0" anchor="ctr"/>
+          <a:lstStyle/>
+          <a:p>
+            <a:pPr algn="ctr" indent="0" marL="0">
+              <a:buNone/>
+            </a:pPr>
+            <a:r>
+              <a:rPr lang="en-US" sz="1000" dirty="0">
+                <a:solidFill>
+                  <a:srgbClr val="1E293B"/>
+                </a:solidFill>
+                <a:latin typeface="Calibri" pitchFamily="34" charset="0"/>
+                <a:ea typeface="Calibri" pitchFamily="34" charset="-122"/>
+                <a:cs typeface="Calibri" pitchFamily="34" charset="-120"/>
+              </a:rPr>
+              <a:t>Mistral Large 3</a:t>
+            </a:r>
+            <a:endParaRPr lang="en-US" sz="1000" dirty="0"/>
+          </a:p>
+          <a:p>
+            <a:pPr algn="ctr" indent="0" marL="0">
+              <a:buNone/>
+            </a:pPr>
+            <a:r>
+              <a:rPr lang="en-US" sz="1000" dirty="0">
+                <a:solidFill>
+                  <a:srgbClr val="1E293B"/>
+                </a:solidFill>
+                <a:latin typeface="Calibri" pitchFamily="34" charset="0"/>
+                <a:ea typeface="Calibri" pitchFamily="34" charset="-122"/>
+                <a:cs typeface="Calibri" pitchFamily="34" charset="-120"/>
+              </a:rPr>
+              <a:t>Macro-F1: 0.640</a:t>
+            </a:r>
+            <a:endParaRPr lang="en-US" sz="1000" dirty="0"/>
+          </a:p>
+        </p:txBody>
+      </p:sp>
+      <p:sp>
+        <p:nvSpPr>
+          <p:cNvPr id="13" name="Shape 10"/>
+          <p:cNvSpPr/>
+          <p:nvPr/>
+        </p:nvSpPr>
+        <p:spPr>
+          <a:xfrm>
+            <a:off x="6187288" y="5394960"/>
+            <a:ext cx="2560320" cy="914400"/>
+          </a:xfrm>
+          <a:prstGeom prst="rect">
+            <a:avLst>
+              <a:gd name="adj" fmla="val 8000"/>
+            </a:avLst>
+          </a:prstGeom>
+          <a:solidFill>
+            <a:srgbClr val="FFFFFF"/>
+          </a:solidFill>
+          <a:ln/>
+          <a:effectLst>
+            <a:outerShdw sx="100000" sy="100000" kx="0" ky="0" algn="bl" rotWithShape="0" blurRad="50800" dist="25400" dir="16200000">
+              <a:srgbClr val="000000">
+                <a:alpha val="15000"/>
+              </a:srgbClr>
+            </a:outerShdw>
+          </a:effectLst>
+        </p:spPr>
+      </p:sp>
+      <p:sp>
+        <p:nvSpPr>
+          <p:cNvPr id="14" name="Shape 11"/>
+          <p:cNvSpPr/>
+          <p:nvPr/>
+        </p:nvSpPr>
+        <p:spPr>
+          <a:xfrm>
+            <a:off x="6187288" y="5394960"/>
+            <a:ext cx="2560320" cy="45720"/>
+          </a:xfrm>
+          <a:prstGeom prst="rect">
+            <a:avLst/>
+          </a:prstGeom>
+          <a:solidFill>
+            <a:srgbClr val="D62728"/>
+          </a:solidFill>
+          <a:ln/>
+        </p:spPr>
+      </p:sp>
+      <p:sp>
+        <p:nvSpPr>
+          <p:cNvPr id="15" name="Text 12"/>
+          <p:cNvSpPr/>
+          <p:nvPr/>
+        </p:nvSpPr>
+        <p:spPr>
+          <a:xfrm>
+            <a:off x="6187288" y="5468112"/>
+            <a:ext cx="2560320" cy="274320"/>
+          </a:xfrm>
+          <a:prstGeom prst="rect">
+            <a:avLst/>
+          </a:prstGeom>
+          <a:noFill/>
+          <a:ln/>
+        </p:spPr>
+        <p:txBody>
+          <a:bodyPr wrap="square" rtlCol="0" anchor="ctr"/>
+          <a:lstStyle/>
+          <a:p>
+            <a:pPr algn="ctr" indent="0" marL="0">
+              <a:buNone/>
+            </a:pPr>
+            <a:r>
+              <a:rPr lang="en-US" sz="1100" b="1" dirty="0">
+                <a:solidFill>
+                  <a:srgbClr val="D62728"/>
+                </a:solidFill>
+                <a:latin typeface="Georgia" pitchFamily="34" charset="0"/>
+                <a:ea typeface="Georgia" pitchFamily="34" charset="-122"/>
+                <a:cs typeface="Georgia" pitchFamily="34" charset="-120"/>
+              </a:rPr>
+              <a:t>Fine-Tuned</a:t>
+            </a:r>
+            <a:endParaRPr lang="en-US" sz="1100" dirty="0"/>
+          </a:p>
+        </p:txBody>
+      </p:sp>
+      <p:sp>
+        <p:nvSpPr>
+          <p:cNvPr id="16" name="Text 13"/>
+          <p:cNvSpPr/>
+          <p:nvPr/>
+        </p:nvSpPr>
+        <p:spPr>
+          <a:xfrm>
+            <a:off x="6278728" y="5742432"/>
+            <a:ext cx="2377440" cy="502920"/>
+          </a:xfrm>
+          <a:prstGeom prst="rect">
+            <a:avLst/>
+          </a:prstGeom>
+          <a:noFill/>
+          <a:ln/>
+        </p:spPr>
+        <p:txBody>
+          <a:bodyPr wrap="square" rtlCol="0" anchor="ctr"/>
+          <a:lstStyle/>
+          <a:p>
+            <a:pPr algn="ctr" indent="0" marL="0">
+              <a:buNone/>
+            </a:pPr>
+            <a:r>
+              <a:rPr lang="en-US" sz="1000" dirty="0">
+                <a:solidFill>
+                  <a:srgbClr val="1E293B"/>
+                </a:solidFill>
+                <a:latin typeface="Calibri" pitchFamily="34" charset="0"/>
+                <a:ea typeface="Calibri" pitchFamily="34" charset="-122"/>
+                <a:cs typeface="Calibri" pitchFamily="34" charset="-120"/>
+              </a:rPr>
+              <a:t>Qwen3-8B QLoRA</a:t>
+            </a:r>
+            <a:endParaRPr lang="en-US" sz="1000" dirty="0"/>
+          </a:p>
+          <a:p>
+            <a:pPr algn="ctr" indent="0" marL="0">
+              <a:buNone/>
+            </a:pPr>
+            <a:r>
+              <a:rPr lang="en-US" sz="1000" dirty="0">
+                <a:solidFill>
+                  <a:srgbClr val="1E293B"/>
+                </a:solidFill>
+                <a:latin typeface="Calibri" pitchFamily="34" charset="0"/>
+                <a:ea typeface="Calibri" pitchFamily="34" charset="-122"/>
+                <a:cs typeface="Calibri" pitchFamily="34" charset="-120"/>
+              </a:rPr>
+              <a:t>Macro-F1: 0.510</a:t>
+            </a:r>
+            <a:endParaRPr lang="en-US" sz="1000" dirty="0"/>
+          </a:p>
+        </p:txBody>
+      </p:sp>
+      <p:sp>
+        <p:nvSpPr>
+          <p:cNvPr id="17" name="Shape 14"/>
+          <p:cNvSpPr/>
+          <p:nvPr/>
+        </p:nvSpPr>
+        <p:spPr>
+          <a:xfrm>
+            <a:off x="8930488" y="5394960"/>
+            <a:ext cx="2560320" cy="914400"/>
+          </a:xfrm>
+          <a:prstGeom prst="rect">
+            <a:avLst>
+              <a:gd name="adj" fmla="val 8000"/>
+            </a:avLst>
+          </a:prstGeom>
+          <a:solidFill>
+            <a:srgbClr val="FFFFFF"/>
+          </a:solidFill>
+          <a:ln/>
+          <a:effectLst>
+            <a:outerShdw sx="100000" sy="100000" kx="0" ky="0" algn="bl" rotWithShape="0" blurRad="50800" dist="25400" dir="16200000">
+              <a:srgbClr val="000000">
+                <a:alpha val="15000"/>
+              </a:srgbClr>
+            </a:outerShdw>
+          </a:effectLst>
+        </p:spPr>
+      </p:sp>
+      <p:sp>
+        <p:nvSpPr>
+          <p:cNvPr id="18" name="Shape 15"/>
+          <p:cNvSpPr/>
+          <p:nvPr/>
+        </p:nvSpPr>
+        <p:spPr>
+          <a:xfrm>
+            <a:off x="8930488" y="5394960"/>
+            <a:ext cx="2560320" cy="45720"/>
+          </a:xfrm>
+          <a:prstGeom prst="rect">
+            <a:avLst/>
+          </a:prstGeom>
+          <a:solidFill>
+            <a:srgbClr val="2CA02C"/>
+          </a:solidFill>
+          <a:ln/>
+        </p:spPr>
+      </p:sp>
+      <p:sp>
+        <p:nvSpPr>
+          <p:cNvPr id="19" name="Text 16"/>
+          <p:cNvSpPr/>
+          <p:nvPr/>
+        </p:nvSpPr>
+        <p:spPr>
+          <a:xfrm>
+            <a:off x="8930488" y="5468112"/>
+            <a:ext cx="2560320" cy="274320"/>
+          </a:xfrm>
+          <a:prstGeom prst="rect">
+            <a:avLst/>
+          </a:prstGeom>
+          <a:noFill/>
+          <a:ln/>
+        </p:spPr>
+        <p:txBody>
+          <a:bodyPr wrap="square" rtlCol="0" anchor="ctr"/>
+          <a:lstStyle/>
+          <a:p>
+            <a:pPr algn="ctr" indent="0" marL="0">
+              <a:buNone/>
+            </a:pPr>
+            <a:r>
+              <a:rPr lang="en-US" sz="1100" b="1" dirty="0">
+                <a:solidFill>
+                  <a:srgbClr val="2CA02C"/>
+                </a:solidFill>
+                <a:latin typeface="Georgia" pitchFamily="34" charset="0"/>
+                <a:ea typeface="Georgia" pitchFamily="34" charset="-122"/>
+                <a:cs typeface="Georgia" pitchFamily="34" charset="-120"/>
+              </a:rPr>
+              <a:t>Classic ML</a:t>
+            </a:r>
+            <a:endParaRPr lang="en-US" sz="1100" dirty="0"/>
+          </a:p>
+        </p:txBody>
+      </p:sp>
+      <p:sp>
+        <p:nvSpPr>
+          <p:cNvPr id="20" name="Text 17"/>
+          <p:cNvSpPr/>
+          <p:nvPr/>
+        </p:nvSpPr>
+        <p:spPr>
+          <a:xfrm>
+            <a:off x="9021928" y="5742432"/>
+            <a:ext cx="2377440" cy="502920"/>
+          </a:xfrm>
+          <a:prstGeom prst="rect">
+            <a:avLst/>
+          </a:prstGeom>
+          <a:noFill/>
+          <a:ln/>
+        </p:spPr>
+        <p:txBody>
+          <a:bodyPr wrap="square" rtlCol="0" anchor="ctr"/>
+          <a:lstStyle/>
+          <a:p>
+            <a:pPr algn="ctr" indent="0" marL="0">
+              <a:buNone/>
+            </a:pPr>
+            <a:r>
+              <a:rPr lang="en-US" sz="1000" dirty="0">
+                <a:solidFill>
+                  <a:srgbClr val="1E293B"/>
+                </a:solidFill>
+                <a:latin typeface="Calibri" pitchFamily="34" charset="0"/>
+                <a:ea typeface="Calibri" pitchFamily="34" charset="-122"/>
+                <a:cs typeface="Calibri" pitchFamily="34" charset="-120"/>
+              </a:rPr>
+              <a:t>TF-IDF + XGBoost</a:t>
+            </a:r>
+            <a:endParaRPr lang="en-US" sz="1000" dirty="0"/>
+          </a:p>
+          <a:p>
+            <a:pPr algn="ctr" indent="0" marL="0">
+              <a:buNone/>
+            </a:pPr>
+            <a:r>
+              <a:rPr lang="en-US" sz="1000" dirty="0">
+                <a:solidFill>
+                  <a:srgbClr val="1E293B"/>
+                </a:solidFill>
+                <a:latin typeface="Calibri" pitchFamily="34" charset="0"/>
+                <a:ea typeface="Calibri" pitchFamily="34" charset="-122"/>
+                <a:cs typeface="Calibri" pitchFamily="34" charset="-120"/>
+              </a:rPr>
+              <a:t>Macro-F1: 0.691</a:t>
+            </a:r>
+            <a:endParaRPr lang="en-US" sz="1000" dirty="0"/>
+          </a:p>
+        </p:txBody>
+      </p:sp>
+      <p:sp>
+        <p:nvSpPr>
+          <p:cNvPr id="21" name="Text 18"/>
           <p:cNvSpPr/>
           <p:nvPr/>
         </p:nvSpPr>
@@ -9662,7 +8781,7 @@
                 <a:ea typeface="Calibri" pitchFamily="34" charset="-122"/>
                 <a:cs typeface="Calibri" pitchFamily="34" charset="-120"/>
               </a:rPr>
-              <a:t>7 / 13</a:t>
+              <a:t>7 / 12</a:t>
             </a:r>
             <a:endParaRPr lang="en-US" sz="1000" dirty="0"/>
           </a:p>
@@ -9753,7 +8872,7 @@
                 <a:ea typeface="Georgia" pitchFamily="34" charset="-122"/>
                 <a:cs typeface="Georgia" pitchFamily="34" charset="-120"/>
               </a:rPr>
-              <a:t>Най-добър модел по подход</a:t>
+              <a:t>F1 по категория и модел (хийтмап)</a:t>
             </a:r>
             <a:endParaRPr lang="en-US" sz="2600" dirty="0"/>
           </a:p>
@@ -9775,7 +8894,7 @@
         <p:spPr>
           <a:xfrm>
             <a:off x="548640" y="1005840"/>
-            <a:ext cx="11094415" cy="4206240"/>
+            <a:ext cx="11094415" cy="4846320"/>
           </a:xfrm>
           <a:prstGeom prst="rect">
             <a:avLst/>
@@ -9784,63 +8903,14 @@
       </p:pic>
       <p:sp>
         <p:nvSpPr>
-          <p:cNvPr id="5" name="Shape 2"/>
-          <p:cNvSpPr/>
-          <p:nvPr/>
-        </p:nvSpPr>
-        <p:spPr>
-          <a:xfrm>
-            <a:off x="700888" y="5394960"/>
-            <a:ext cx="2560320" cy="914400"/>
-          </a:xfrm>
-          <a:prstGeom prst="rect">
-            <a:avLst>
-              <a:gd name="adj" fmla="val 8000"/>
-            </a:avLst>
-          </a:prstGeom>
-          <a:solidFill>
-            <a:srgbClr val="FFFFFF"/>
-          </a:solidFill>
-          <a:ln/>
-          <a:effectLst>
-            <a:outerShdw sx="100000" sy="100000" kx="0" ky="0" algn="bl" rotWithShape="0" blurRad="50800" dist="25400" dir="16200000">
-              <a:srgbClr val="000000">
-                <a:alpha val="15000"/>
-              </a:srgbClr>
-            </a:outerShdw>
-          </a:effectLst>
-        </p:spPr>
-      </p:sp>
-      <p:sp>
-        <p:nvSpPr>
-          <p:cNvPr id="6" name="Shape 3"/>
-          <p:cNvSpPr/>
-          <p:nvPr/>
-        </p:nvSpPr>
-        <p:spPr>
-          <a:xfrm>
-            <a:off x="700888" y="5394960"/>
-            <a:ext cx="2560320" cy="45720"/>
-          </a:xfrm>
-          <a:prstGeom prst="rect">
-            <a:avLst/>
-          </a:prstGeom>
-          <a:solidFill>
-            <a:srgbClr val="1F77B4"/>
-          </a:solidFill>
-          <a:ln/>
-        </p:spPr>
-      </p:sp>
-      <p:sp>
-        <p:nvSpPr>
-          <p:cNvPr id="7" name="Text 4"/>
-          <p:cNvSpPr/>
-          <p:nvPr/>
-        </p:nvSpPr>
-        <p:spPr>
-          <a:xfrm>
-            <a:off x="700888" y="5468112"/>
-            <a:ext cx="2560320" cy="274320"/>
+          <p:cNvPr id="5" name="Text 2"/>
+          <p:cNvSpPr/>
+          <p:nvPr/>
+        </p:nvSpPr>
+        <p:spPr>
+          <a:xfrm>
+            <a:off x="548640" y="5943600"/>
+            <a:ext cx="11094415" cy="365760"/>
           </a:xfrm>
           <a:prstGeom prst="rect">
             <a:avLst/>
@@ -9856,15 +8926,15 @@
               <a:buNone/>
             </a:pPr>
             <a:r>
-              <a:rPr lang="en-US" sz="1100" b="1" dirty="0">
-                <a:solidFill>
-                  <a:srgbClr val="1F77B4"/>
-                </a:solidFill>
-                <a:latin typeface="Georgia" pitchFamily="34" charset="0"/>
-                <a:ea typeface="Georgia" pitchFamily="34" charset="-122"/>
-                <a:cs typeface="Georgia" pitchFamily="34" charset="-120"/>
-              </a:rPr>
-              <a:t>Zero-Shot</a:t>
+              <a:rPr lang="en-US" sz="1100" i="1" dirty="0">
+                <a:solidFill>
+                  <a:srgbClr val="64748B"/>
+                </a:solidFill>
+                <a:latin typeface="Calibri" pitchFamily="34" charset="0"/>
+                <a:ea typeface="Calibri" pitchFamily="34" charset="-122"/>
+                <a:cs typeface="Calibri" pitchFamily="34" charset="-120"/>
+              </a:rPr>
+              <a:t>Стойности F1 за 13 категории × 15 модела. По-тъмно = по-висок F1. Classic ML доминира в повечето категории.</a:t>
             </a:r>
             <a:endParaRPr lang="en-US" sz="1100" dirty="0"/>
           </a:p>
@@ -9872,495 +8942,7 @@
       </p:sp>
       <p:sp>
         <p:nvSpPr>
-          <p:cNvPr id="8" name="Text 5"/>
-          <p:cNvSpPr/>
-          <p:nvPr/>
-        </p:nvSpPr>
-        <p:spPr>
-          <a:xfrm>
-            <a:off x="792328" y="5742432"/>
-            <a:ext cx="2377440" cy="502920"/>
-          </a:xfrm>
-          <a:prstGeom prst="rect">
-            <a:avLst/>
-          </a:prstGeom>
-          <a:noFill/>
-          <a:ln/>
-        </p:spPr>
-        <p:txBody>
-          <a:bodyPr wrap="square" rtlCol="0" anchor="ctr"/>
-          <a:lstStyle/>
-          <a:p>
-            <a:pPr algn="ctr" indent="0" marL="0">
-              <a:buNone/>
-            </a:pPr>
-            <a:r>
-              <a:rPr lang="en-US" sz="1000" dirty="0">
-                <a:solidFill>
-                  <a:srgbClr val="1E293B"/>
-                </a:solidFill>
-                <a:latin typeface="Calibri" pitchFamily="34" charset="0"/>
-                <a:ea typeface="Calibri" pitchFamily="34" charset="-122"/>
-                <a:cs typeface="Calibri" pitchFamily="34" charset="-120"/>
-              </a:rPr>
-              <a:t>Mistral Large 3</a:t>
-            </a:r>
-            <a:endParaRPr lang="en-US" sz="1000" dirty="0"/>
-          </a:p>
-          <a:p>
-            <a:pPr algn="ctr" indent="0" marL="0">
-              <a:buNone/>
-            </a:pPr>
-            <a:r>
-              <a:rPr lang="en-US" sz="1000" dirty="0">
-                <a:solidFill>
-                  <a:srgbClr val="1E293B"/>
-                </a:solidFill>
-                <a:latin typeface="Calibri" pitchFamily="34" charset="0"/>
-                <a:ea typeface="Calibri" pitchFamily="34" charset="-122"/>
-                <a:cs typeface="Calibri" pitchFamily="34" charset="-120"/>
-              </a:rPr>
-              <a:t>Macro-F1: 0.658</a:t>
-            </a:r>
-            <a:endParaRPr lang="en-US" sz="1000" dirty="0"/>
-          </a:p>
-        </p:txBody>
-      </p:sp>
-      <p:sp>
-        <p:nvSpPr>
-          <p:cNvPr id="9" name="Shape 6"/>
-          <p:cNvSpPr/>
-          <p:nvPr/>
-        </p:nvSpPr>
-        <p:spPr>
-          <a:xfrm>
-            <a:off x="3444088" y="5394960"/>
-            <a:ext cx="2560320" cy="914400"/>
-          </a:xfrm>
-          <a:prstGeom prst="rect">
-            <a:avLst>
-              <a:gd name="adj" fmla="val 8000"/>
-            </a:avLst>
-          </a:prstGeom>
-          <a:solidFill>
-            <a:srgbClr val="FFFFFF"/>
-          </a:solidFill>
-          <a:ln/>
-          <a:effectLst>
-            <a:outerShdw sx="100000" sy="100000" kx="0" ky="0" algn="bl" rotWithShape="0" blurRad="50800" dist="25400" dir="16200000">
-              <a:srgbClr val="000000">
-                <a:alpha val="15000"/>
-              </a:srgbClr>
-            </a:outerShdw>
-          </a:effectLst>
-        </p:spPr>
-      </p:sp>
-      <p:sp>
-        <p:nvSpPr>
-          <p:cNvPr id="10" name="Shape 7"/>
-          <p:cNvSpPr/>
-          <p:nvPr/>
-        </p:nvSpPr>
-        <p:spPr>
-          <a:xfrm>
-            <a:off x="3444088" y="5394960"/>
-            <a:ext cx="2560320" cy="45720"/>
-          </a:xfrm>
-          <a:prstGeom prst="rect">
-            <a:avLst/>
-          </a:prstGeom>
-          <a:solidFill>
-            <a:srgbClr val="FF7F0E"/>
-          </a:solidFill>
-          <a:ln/>
-        </p:spPr>
-      </p:sp>
-      <p:sp>
-        <p:nvSpPr>
-          <p:cNvPr id="11" name="Text 8"/>
-          <p:cNvSpPr/>
-          <p:nvPr/>
-        </p:nvSpPr>
-        <p:spPr>
-          <a:xfrm>
-            <a:off x="3444088" y="5468112"/>
-            <a:ext cx="2560320" cy="274320"/>
-          </a:xfrm>
-          <a:prstGeom prst="rect">
-            <a:avLst/>
-          </a:prstGeom>
-          <a:noFill/>
-          <a:ln/>
-        </p:spPr>
-        <p:txBody>
-          <a:bodyPr wrap="square" rtlCol="0" anchor="ctr"/>
-          <a:lstStyle/>
-          <a:p>
-            <a:pPr algn="ctr" indent="0" marL="0">
-              <a:buNone/>
-            </a:pPr>
-            <a:r>
-              <a:rPr lang="en-US" sz="1100" b="1" dirty="0">
-                <a:solidFill>
-                  <a:srgbClr val="FF7F0E"/>
-                </a:solidFill>
-                <a:latin typeface="Georgia" pitchFamily="34" charset="0"/>
-                <a:ea typeface="Georgia" pitchFamily="34" charset="-122"/>
-                <a:cs typeface="Georgia" pitchFamily="34" charset="-120"/>
-              </a:rPr>
-              <a:t>Few-Shot</a:t>
-            </a:r>
-            <a:endParaRPr lang="en-US" sz="1100" dirty="0"/>
-          </a:p>
-        </p:txBody>
-      </p:sp>
-      <p:sp>
-        <p:nvSpPr>
-          <p:cNvPr id="12" name="Text 9"/>
-          <p:cNvSpPr/>
-          <p:nvPr/>
-        </p:nvSpPr>
-        <p:spPr>
-          <a:xfrm>
-            <a:off x="3535528" y="5742432"/>
-            <a:ext cx="2377440" cy="502920"/>
-          </a:xfrm>
-          <a:prstGeom prst="rect">
-            <a:avLst/>
-          </a:prstGeom>
-          <a:noFill/>
-          <a:ln/>
-        </p:spPr>
-        <p:txBody>
-          <a:bodyPr wrap="square" rtlCol="0" anchor="ctr"/>
-          <a:lstStyle/>
-          <a:p>
-            <a:pPr algn="ctr" indent="0" marL="0">
-              <a:buNone/>
-            </a:pPr>
-            <a:r>
-              <a:rPr lang="en-US" sz="1000" dirty="0">
-                <a:solidFill>
-                  <a:srgbClr val="1E293B"/>
-                </a:solidFill>
-                <a:latin typeface="Calibri" pitchFamily="34" charset="0"/>
-                <a:ea typeface="Calibri" pitchFamily="34" charset="-122"/>
-                <a:cs typeface="Calibri" pitchFamily="34" charset="-120"/>
-              </a:rPr>
-              <a:t>Mistral Large 3</a:t>
-            </a:r>
-            <a:endParaRPr lang="en-US" sz="1000" dirty="0"/>
-          </a:p>
-          <a:p>
-            <a:pPr algn="ctr" indent="0" marL="0">
-              <a:buNone/>
-            </a:pPr>
-            <a:r>
-              <a:rPr lang="en-US" sz="1000" dirty="0">
-                <a:solidFill>
-                  <a:srgbClr val="1E293B"/>
-                </a:solidFill>
-                <a:latin typeface="Calibri" pitchFamily="34" charset="0"/>
-                <a:ea typeface="Calibri" pitchFamily="34" charset="-122"/>
-                <a:cs typeface="Calibri" pitchFamily="34" charset="-120"/>
-              </a:rPr>
-              <a:t>Macro-F1: 0.640</a:t>
-            </a:r>
-            <a:endParaRPr lang="en-US" sz="1000" dirty="0"/>
-          </a:p>
-        </p:txBody>
-      </p:sp>
-      <p:sp>
-        <p:nvSpPr>
-          <p:cNvPr id="13" name="Shape 10"/>
-          <p:cNvSpPr/>
-          <p:nvPr/>
-        </p:nvSpPr>
-        <p:spPr>
-          <a:xfrm>
-            <a:off x="6187288" y="5394960"/>
-            <a:ext cx="2560320" cy="914400"/>
-          </a:xfrm>
-          <a:prstGeom prst="rect">
-            <a:avLst>
-              <a:gd name="adj" fmla="val 8000"/>
-            </a:avLst>
-          </a:prstGeom>
-          <a:solidFill>
-            <a:srgbClr val="FFFFFF"/>
-          </a:solidFill>
-          <a:ln/>
-          <a:effectLst>
-            <a:outerShdw sx="100000" sy="100000" kx="0" ky="0" algn="bl" rotWithShape="0" blurRad="50800" dist="25400" dir="16200000">
-              <a:srgbClr val="000000">
-                <a:alpha val="15000"/>
-              </a:srgbClr>
-            </a:outerShdw>
-          </a:effectLst>
-        </p:spPr>
-      </p:sp>
-      <p:sp>
-        <p:nvSpPr>
-          <p:cNvPr id="14" name="Shape 11"/>
-          <p:cNvSpPr/>
-          <p:nvPr/>
-        </p:nvSpPr>
-        <p:spPr>
-          <a:xfrm>
-            <a:off x="6187288" y="5394960"/>
-            <a:ext cx="2560320" cy="45720"/>
-          </a:xfrm>
-          <a:prstGeom prst="rect">
-            <a:avLst/>
-          </a:prstGeom>
-          <a:solidFill>
-            <a:srgbClr val="D62728"/>
-          </a:solidFill>
-          <a:ln/>
-        </p:spPr>
-      </p:sp>
-      <p:sp>
-        <p:nvSpPr>
-          <p:cNvPr id="15" name="Text 12"/>
-          <p:cNvSpPr/>
-          <p:nvPr/>
-        </p:nvSpPr>
-        <p:spPr>
-          <a:xfrm>
-            <a:off x="6187288" y="5468112"/>
-            <a:ext cx="2560320" cy="274320"/>
-          </a:xfrm>
-          <a:prstGeom prst="rect">
-            <a:avLst/>
-          </a:prstGeom>
-          <a:noFill/>
-          <a:ln/>
-        </p:spPr>
-        <p:txBody>
-          <a:bodyPr wrap="square" rtlCol="0" anchor="ctr"/>
-          <a:lstStyle/>
-          <a:p>
-            <a:pPr algn="ctr" indent="0" marL="0">
-              <a:buNone/>
-            </a:pPr>
-            <a:r>
-              <a:rPr lang="en-US" sz="1100" b="1" dirty="0">
-                <a:solidFill>
-                  <a:srgbClr val="D62728"/>
-                </a:solidFill>
-                <a:latin typeface="Georgia" pitchFamily="34" charset="0"/>
-                <a:ea typeface="Georgia" pitchFamily="34" charset="-122"/>
-                <a:cs typeface="Georgia" pitchFamily="34" charset="-120"/>
-              </a:rPr>
-              <a:t>Fine-Tuned</a:t>
-            </a:r>
-            <a:endParaRPr lang="en-US" sz="1100" dirty="0"/>
-          </a:p>
-        </p:txBody>
-      </p:sp>
-      <p:sp>
-        <p:nvSpPr>
-          <p:cNvPr id="16" name="Text 13"/>
-          <p:cNvSpPr/>
-          <p:nvPr/>
-        </p:nvSpPr>
-        <p:spPr>
-          <a:xfrm>
-            <a:off x="6278728" y="5742432"/>
-            <a:ext cx="2377440" cy="502920"/>
-          </a:xfrm>
-          <a:prstGeom prst="rect">
-            <a:avLst/>
-          </a:prstGeom>
-          <a:noFill/>
-          <a:ln/>
-        </p:spPr>
-        <p:txBody>
-          <a:bodyPr wrap="square" rtlCol="0" anchor="ctr"/>
-          <a:lstStyle/>
-          <a:p>
-            <a:pPr algn="ctr" indent="0" marL="0">
-              <a:buNone/>
-            </a:pPr>
-            <a:r>
-              <a:rPr lang="en-US" sz="1000" dirty="0">
-                <a:solidFill>
-                  <a:srgbClr val="1E293B"/>
-                </a:solidFill>
-                <a:latin typeface="Calibri" pitchFamily="34" charset="0"/>
-                <a:ea typeface="Calibri" pitchFamily="34" charset="-122"/>
-                <a:cs typeface="Calibri" pitchFamily="34" charset="-120"/>
-              </a:rPr>
-              <a:t>Qwen3-8B QLoRA</a:t>
-            </a:r>
-            <a:endParaRPr lang="en-US" sz="1000" dirty="0"/>
-          </a:p>
-          <a:p>
-            <a:pPr algn="ctr" indent="0" marL="0">
-              <a:buNone/>
-            </a:pPr>
-            <a:r>
-              <a:rPr lang="en-US" sz="1000" dirty="0">
-                <a:solidFill>
-                  <a:srgbClr val="1E293B"/>
-                </a:solidFill>
-                <a:latin typeface="Calibri" pitchFamily="34" charset="0"/>
-                <a:ea typeface="Calibri" pitchFamily="34" charset="-122"/>
-                <a:cs typeface="Calibri" pitchFamily="34" charset="-120"/>
-              </a:rPr>
-              <a:t>Macro-F1: 0.510</a:t>
-            </a:r>
-            <a:endParaRPr lang="en-US" sz="1000" dirty="0"/>
-          </a:p>
-        </p:txBody>
-      </p:sp>
-      <p:sp>
-        <p:nvSpPr>
-          <p:cNvPr id="17" name="Shape 14"/>
-          <p:cNvSpPr/>
-          <p:nvPr/>
-        </p:nvSpPr>
-        <p:spPr>
-          <a:xfrm>
-            <a:off x="8930488" y="5394960"/>
-            <a:ext cx="2560320" cy="914400"/>
-          </a:xfrm>
-          <a:prstGeom prst="rect">
-            <a:avLst>
-              <a:gd name="adj" fmla="val 8000"/>
-            </a:avLst>
-          </a:prstGeom>
-          <a:solidFill>
-            <a:srgbClr val="FFFFFF"/>
-          </a:solidFill>
-          <a:ln/>
-          <a:effectLst>
-            <a:outerShdw sx="100000" sy="100000" kx="0" ky="0" algn="bl" rotWithShape="0" blurRad="50800" dist="25400" dir="16200000">
-              <a:srgbClr val="000000">
-                <a:alpha val="15000"/>
-              </a:srgbClr>
-            </a:outerShdw>
-          </a:effectLst>
-        </p:spPr>
-      </p:sp>
-      <p:sp>
-        <p:nvSpPr>
-          <p:cNvPr id="18" name="Shape 15"/>
-          <p:cNvSpPr/>
-          <p:nvPr/>
-        </p:nvSpPr>
-        <p:spPr>
-          <a:xfrm>
-            <a:off x="8930488" y="5394960"/>
-            <a:ext cx="2560320" cy="45720"/>
-          </a:xfrm>
-          <a:prstGeom prst="rect">
-            <a:avLst/>
-          </a:prstGeom>
-          <a:solidFill>
-            <a:srgbClr val="2CA02C"/>
-          </a:solidFill>
-          <a:ln/>
-        </p:spPr>
-      </p:sp>
-      <p:sp>
-        <p:nvSpPr>
-          <p:cNvPr id="19" name="Text 16"/>
-          <p:cNvSpPr/>
-          <p:nvPr/>
-        </p:nvSpPr>
-        <p:spPr>
-          <a:xfrm>
-            <a:off x="8930488" y="5468112"/>
-            <a:ext cx="2560320" cy="274320"/>
-          </a:xfrm>
-          <a:prstGeom prst="rect">
-            <a:avLst/>
-          </a:prstGeom>
-          <a:noFill/>
-          <a:ln/>
-        </p:spPr>
-        <p:txBody>
-          <a:bodyPr wrap="square" rtlCol="0" anchor="ctr"/>
-          <a:lstStyle/>
-          <a:p>
-            <a:pPr algn="ctr" indent="0" marL="0">
-              <a:buNone/>
-            </a:pPr>
-            <a:r>
-              <a:rPr lang="en-US" sz="1100" b="1" dirty="0">
-                <a:solidFill>
-                  <a:srgbClr val="2CA02C"/>
-                </a:solidFill>
-                <a:latin typeface="Georgia" pitchFamily="34" charset="0"/>
-                <a:ea typeface="Georgia" pitchFamily="34" charset="-122"/>
-                <a:cs typeface="Georgia" pitchFamily="34" charset="-120"/>
-              </a:rPr>
-              <a:t>Classic ML</a:t>
-            </a:r>
-            <a:endParaRPr lang="en-US" sz="1100" dirty="0"/>
-          </a:p>
-        </p:txBody>
-      </p:sp>
-      <p:sp>
-        <p:nvSpPr>
-          <p:cNvPr id="20" name="Text 17"/>
-          <p:cNvSpPr/>
-          <p:nvPr/>
-        </p:nvSpPr>
-        <p:spPr>
-          <a:xfrm>
-            <a:off x="9021928" y="5742432"/>
-            <a:ext cx="2377440" cy="502920"/>
-          </a:xfrm>
-          <a:prstGeom prst="rect">
-            <a:avLst/>
-          </a:prstGeom>
-          <a:noFill/>
-          <a:ln/>
-        </p:spPr>
-        <p:txBody>
-          <a:bodyPr wrap="square" rtlCol="0" anchor="ctr"/>
-          <a:lstStyle/>
-          <a:p>
-            <a:pPr algn="ctr" indent="0" marL="0">
-              <a:buNone/>
-            </a:pPr>
-            <a:r>
-              <a:rPr lang="en-US" sz="1000" dirty="0">
-                <a:solidFill>
-                  <a:srgbClr val="1E293B"/>
-                </a:solidFill>
-                <a:latin typeface="Calibri" pitchFamily="34" charset="0"/>
-                <a:ea typeface="Calibri" pitchFamily="34" charset="-122"/>
-                <a:cs typeface="Calibri" pitchFamily="34" charset="-120"/>
-              </a:rPr>
-              <a:t>TF-IDF + XGBoost</a:t>
-            </a:r>
-            <a:endParaRPr lang="en-US" sz="1000" dirty="0"/>
-          </a:p>
-          <a:p>
-            <a:pPr algn="ctr" indent="0" marL="0">
-              <a:buNone/>
-            </a:pPr>
-            <a:r>
-              <a:rPr lang="en-US" sz="1000" dirty="0">
-                <a:solidFill>
-                  <a:srgbClr val="1E293B"/>
-                </a:solidFill>
-                <a:latin typeface="Calibri" pitchFamily="34" charset="0"/>
-                <a:ea typeface="Calibri" pitchFamily="34" charset="-122"/>
-                <a:cs typeface="Calibri" pitchFamily="34" charset="-120"/>
-              </a:rPr>
-              <a:t>Macro-F1: 0.691</a:t>
-            </a:r>
-            <a:endParaRPr lang="en-US" sz="1000" dirty="0"/>
-          </a:p>
-        </p:txBody>
-      </p:sp>
-      <p:sp>
-        <p:nvSpPr>
-          <p:cNvPr id="21" name="Text 18"/>
+          <p:cNvPr id="6" name="Text 3"/>
           <p:cNvSpPr/>
           <p:nvPr/>
         </p:nvSpPr>
@@ -10391,7 +8973,7 @@
                 <a:ea typeface="Calibri" pitchFamily="34" charset="-122"/>
                 <a:cs typeface="Calibri" pitchFamily="34" charset="-120"/>
               </a:rPr>
-              <a:t>8 / 13</a:t>
+              <a:t>8 / 12</a:t>
             </a:r>
             <a:endParaRPr lang="en-US" sz="1000" dirty="0"/>
           </a:p>
@@ -10482,7 +9064,7 @@
                 <a:ea typeface="Georgia" pitchFamily="34" charset="-122"/>
                 <a:cs typeface="Georgia" pitchFamily="34" charset="-120"/>
               </a:rPr>
-              <a:t>F1 по категория и модел (хийтмап)</a:t>
+              <a:t>Цена срещу представяне</a:t>
             </a:r>
             <a:endParaRPr lang="en-US" sz="2600" dirty="0"/>
           </a:p>
@@ -10503,8 +9085,8 @@
         </p:blipFill>
         <p:spPr>
           <a:xfrm>
-            <a:off x="548640" y="1005840"/>
-            <a:ext cx="11094415" cy="4846320"/>
+            <a:off x="365760" y="1005840"/>
+            <a:ext cx="7772400" cy="5029200"/>
           </a:xfrm>
           <a:prstGeom prst="rect">
             <a:avLst/>
@@ -10513,14 +9095,63 @@
       </p:pic>
       <p:sp>
         <p:nvSpPr>
-          <p:cNvPr id="5" name="Text 2"/>
-          <p:cNvSpPr/>
-          <p:nvPr/>
-        </p:nvSpPr>
-        <p:spPr>
-          <a:xfrm>
-            <a:off x="548640" y="5943600"/>
-            <a:ext cx="11094415" cy="365760"/>
+          <p:cNvPr id="5" name="Shape 2"/>
+          <p:cNvSpPr/>
+          <p:nvPr/>
+        </p:nvSpPr>
+        <p:spPr>
+          <a:xfrm>
+            <a:off x="8503920" y="1188720"/>
+            <a:ext cx="3108960" cy="1188720"/>
+          </a:xfrm>
+          <a:prstGeom prst="rect">
+            <a:avLst>
+              <a:gd name="adj" fmla="val 7692"/>
+            </a:avLst>
+          </a:prstGeom>
+          <a:solidFill>
+            <a:srgbClr val="FFFFFF"/>
+          </a:solidFill>
+          <a:ln/>
+          <a:effectLst>
+            <a:outerShdw sx="100000" sy="100000" kx="0" ky="0" algn="bl" rotWithShape="0" blurRad="50800" dist="25400" dir="16200000">
+              <a:srgbClr val="000000">
+                <a:alpha val="15000"/>
+              </a:srgbClr>
+            </a:outerShdw>
+          </a:effectLst>
+        </p:spPr>
+      </p:sp>
+      <p:sp>
+        <p:nvSpPr>
+          <p:cNvPr id="6" name="Shape 3"/>
+          <p:cNvSpPr/>
+          <p:nvPr/>
+        </p:nvSpPr>
+        <p:spPr>
+          <a:xfrm>
+            <a:off x="8503920" y="1188720"/>
+            <a:ext cx="3108960" cy="54864"/>
+          </a:xfrm>
+          <a:prstGeom prst="rect">
+            <a:avLst/>
+          </a:prstGeom>
+          <a:solidFill>
+            <a:srgbClr val="2CA02C"/>
+          </a:solidFill>
+          <a:ln/>
+        </p:spPr>
+      </p:sp>
+      <p:sp>
+        <p:nvSpPr>
+          <p:cNvPr id="7" name="Text 4"/>
+          <p:cNvSpPr/>
+          <p:nvPr/>
+        </p:nvSpPr>
+        <p:spPr>
+          <a:xfrm>
+            <a:off x="8503920" y="1325880"/>
+            <a:ext cx="3108960" cy="594360"/>
           </a:xfrm>
           <a:prstGeom prst="rect">
             <a:avLst/>
@@ -10536,7 +9167,46 @@
               <a:buNone/>
             </a:pPr>
             <a:r>
-              <a:rPr lang="en-US" sz="1100" i="1" dirty="0">
+              <a:rPr lang="en-US" sz="3600" b="1" dirty="0">
+                <a:solidFill>
+                  <a:srgbClr val="2CA02C"/>
+                </a:solidFill>
+                <a:latin typeface="Consolas" pitchFamily="34" charset="0"/>
+                <a:ea typeface="Consolas" pitchFamily="34" charset="-122"/>
+                <a:cs typeface="Consolas" pitchFamily="34" charset="-120"/>
+              </a:rPr>
+              <a:t>$0</a:t>
+            </a:r>
+            <a:endParaRPr lang="en-US" sz="3600" dirty="0"/>
+          </a:p>
+        </p:txBody>
+      </p:sp>
+      <p:sp>
+        <p:nvSpPr>
+          <p:cNvPr id="8" name="Text 5"/>
+          <p:cNvSpPr/>
+          <p:nvPr/>
+        </p:nvSpPr>
+        <p:spPr>
+          <a:xfrm>
+            <a:off x="8595360" y="1783080"/>
+            <a:ext cx="2926080" cy="475488"/>
+          </a:xfrm>
+          <a:prstGeom prst="rect">
+            <a:avLst/>
+          </a:prstGeom>
+          <a:noFill/>
+          <a:ln/>
+        </p:spPr>
+        <p:txBody>
+          <a:bodyPr wrap="square" rtlCol="0" anchor="t"/>
+          <a:lstStyle/>
+          <a:p>
+            <a:pPr algn="ctr" indent="0" marL="0">
+              <a:buNone/>
+            </a:pPr>
+            <a:r>
+              <a:rPr lang="en-US" sz="1300" dirty="0">
                 <a:solidFill>
                   <a:srgbClr val="64748B"/>
                 </a:solidFill>
@@ -10544,15 +9214,359 @@
                 <a:ea typeface="Calibri" pitchFamily="34" charset="-122"/>
                 <a:cs typeface="Calibri" pitchFamily="34" charset="-120"/>
               </a:rPr>
-              <a:t>Стойности F1 за 13 категории × 15 модела. По-тъмно = по-висок F1. Classic ML доминира в повечето категории.</a:t>
-            </a:r>
-            <a:endParaRPr lang="en-US" sz="1100" dirty="0"/>
-          </a:p>
-        </p:txBody>
-      </p:sp>
-      <p:sp>
-        <p:nvSpPr>
-          <p:cNvPr id="6" name="Text 3"/>
+              <a:t>Classic ML</a:t>
+            </a:r>
+            <a:endParaRPr lang="en-US" sz="1300" dirty="0"/>
+          </a:p>
+          <a:p>
+            <a:pPr algn="ctr" indent="0" marL="0">
+              <a:buNone/>
+            </a:pPr>
+            <a:r>
+              <a:rPr lang="en-US" sz="1300" dirty="0">
+                <a:solidFill>
+                  <a:srgbClr val="64748B"/>
+                </a:solidFill>
+                <a:latin typeface="Calibri" pitchFamily="34" charset="0"/>
+                <a:ea typeface="Calibri" pitchFamily="34" charset="-122"/>
+                <a:cs typeface="Calibri" pitchFamily="34" charset="-120"/>
+              </a:rPr>
+              <a:t>(най-висок F1)</a:t>
+            </a:r>
+            <a:endParaRPr lang="en-US" sz="1300" dirty="0"/>
+          </a:p>
+        </p:txBody>
+      </p:sp>
+      <p:sp>
+        <p:nvSpPr>
+          <p:cNvPr id="9" name="Shape 6"/>
+          <p:cNvSpPr/>
+          <p:nvPr/>
+        </p:nvSpPr>
+        <p:spPr>
+          <a:xfrm>
+            <a:off x="8503920" y="2651760"/>
+            <a:ext cx="3108960" cy="1188720"/>
+          </a:xfrm>
+          <a:prstGeom prst="rect">
+            <a:avLst>
+              <a:gd name="adj" fmla="val 7692"/>
+            </a:avLst>
+          </a:prstGeom>
+          <a:solidFill>
+            <a:srgbClr val="FFFFFF"/>
+          </a:solidFill>
+          <a:ln/>
+          <a:effectLst>
+            <a:outerShdw sx="100000" sy="100000" kx="0" ky="0" algn="bl" rotWithShape="0" blurRad="50800" dist="25400" dir="16200000">
+              <a:srgbClr val="000000">
+                <a:alpha val="15000"/>
+              </a:srgbClr>
+            </a:outerShdw>
+          </a:effectLst>
+        </p:spPr>
+      </p:sp>
+      <p:sp>
+        <p:nvSpPr>
+          <p:cNvPr id="10" name="Shape 7"/>
+          <p:cNvSpPr/>
+          <p:nvPr/>
+        </p:nvSpPr>
+        <p:spPr>
+          <a:xfrm>
+            <a:off x="8503920" y="2651760"/>
+            <a:ext cx="3108960" cy="54864"/>
+          </a:xfrm>
+          <a:prstGeom prst="rect">
+            <a:avLst/>
+          </a:prstGeom>
+          <a:solidFill>
+            <a:srgbClr val="5FA8D3"/>
+          </a:solidFill>
+          <a:ln/>
+        </p:spPr>
+      </p:sp>
+      <p:sp>
+        <p:nvSpPr>
+          <p:cNvPr id="11" name="Text 8"/>
+          <p:cNvSpPr/>
+          <p:nvPr/>
+        </p:nvSpPr>
+        <p:spPr>
+          <a:xfrm>
+            <a:off x="8503920" y="2788920"/>
+            <a:ext cx="3108960" cy="594360"/>
+          </a:xfrm>
+          <a:prstGeom prst="rect">
+            <a:avLst/>
+          </a:prstGeom>
+          <a:noFill/>
+          <a:ln/>
+        </p:spPr>
+        <p:txBody>
+          <a:bodyPr wrap="square" rtlCol="0" anchor="ctr"/>
+          <a:lstStyle/>
+          <a:p>
+            <a:pPr algn="ctr" indent="0" marL="0">
+              <a:buNone/>
+            </a:pPr>
+            <a:r>
+              <a:rPr lang="en-US" sz="3600" b="1" dirty="0">
+                <a:solidFill>
+                  <a:srgbClr val="5FA8D3"/>
+                </a:solidFill>
+                <a:latin typeface="Consolas" pitchFamily="34" charset="0"/>
+                <a:ea typeface="Consolas" pitchFamily="34" charset="-122"/>
+                <a:cs typeface="Consolas" pitchFamily="34" charset="-120"/>
+              </a:rPr>
+              <a:t>$6.73</a:t>
+            </a:r>
+            <a:endParaRPr lang="en-US" sz="3600" dirty="0"/>
+          </a:p>
+        </p:txBody>
+      </p:sp>
+      <p:sp>
+        <p:nvSpPr>
+          <p:cNvPr id="12" name="Text 9"/>
+          <p:cNvSpPr/>
+          <p:nvPr/>
+        </p:nvSpPr>
+        <p:spPr>
+          <a:xfrm>
+            <a:off x="8595360" y="3246120"/>
+            <a:ext cx="2926080" cy="475488"/>
+          </a:xfrm>
+          <a:prstGeom prst="rect">
+            <a:avLst/>
+          </a:prstGeom>
+          <a:noFill/>
+          <a:ln/>
+        </p:spPr>
+        <p:txBody>
+          <a:bodyPr wrap="square" rtlCol="0" anchor="t"/>
+          <a:lstStyle/>
+          <a:p>
+            <a:pPr algn="ctr" indent="0" marL="0">
+              <a:buNone/>
+            </a:pPr>
+            <a:r>
+              <a:rPr lang="en-US" sz="1300" dirty="0">
+                <a:solidFill>
+                  <a:srgbClr val="64748B"/>
+                </a:solidFill>
+                <a:latin typeface="Calibri" pitchFamily="34" charset="0"/>
+                <a:ea typeface="Calibri" pitchFamily="34" charset="-122"/>
+                <a:cs typeface="Calibri" pitchFamily="34" charset="-120"/>
+              </a:rPr>
+              <a:t>DeepSeek V3.2</a:t>
+            </a:r>
+            <a:endParaRPr lang="en-US" sz="1300" dirty="0"/>
+          </a:p>
+          <a:p>
+            <a:pPr algn="ctr" indent="0" marL="0">
+              <a:buNone/>
+            </a:pPr>
+            <a:r>
+              <a:rPr lang="en-US" sz="1300" dirty="0">
+                <a:solidFill>
+                  <a:srgbClr val="64748B"/>
+                </a:solidFill>
+                <a:latin typeface="Calibri" pitchFamily="34" charset="0"/>
+                <a:ea typeface="Calibri" pitchFamily="34" charset="-122"/>
+                <a:cs typeface="Calibri" pitchFamily="34" charset="-120"/>
+              </a:rPr>
+              <a:t>+ Thinking</a:t>
+            </a:r>
+            <a:endParaRPr lang="en-US" sz="1300" dirty="0"/>
+          </a:p>
+        </p:txBody>
+      </p:sp>
+      <p:sp>
+        <p:nvSpPr>
+          <p:cNvPr id="13" name="Shape 10"/>
+          <p:cNvSpPr/>
+          <p:nvPr/>
+        </p:nvSpPr>
+        <p:spPr>
+          <a:xfrm>
+            <a:off x="8503920" y="4114800"/>
+            <a:ext cx="3108960" cy="1188720"/>
+          </a:xfrm>
+          <a:prstGeom prst="rect">
+            <a:avLst>
+              <a:gd name="adj" fmla="val 7692"/>
+            </a:avLst>
+          </a:prstGeom>
+          <a:solidFill>
+            <a:srgbClr val="FFFFFF"/>
+          </a:solidFill>
+          <a:ln/>
+          <a:effectLst>
+            <a:outerShdw sx="100000" sy="100000" kx="0" ky="0" algn="bl" rotWithShape="0" blurRad="50800" dist="25400" dir="16200000">
+              <a:srgbClr val="000000">
+                <a:alpha val="15000"/>
+              </a:srgbClr>
+            </a:outerShdw>
+          </a:effectLst>
+        </p:spPr>
+      </p:sp>
+      <p:sp>
+        <p:nvSpPr>
+          <p:cNvPr id="14" name="Shape 11"/>
+          <p:cNvSpPr/>
+          <p:nvPr/>
+        </p:nvSpPr>
+        <p:spPr>
+          <a:xfrm>
+            <a:off x="8503920" y="4114800"/>
+            <a:ext cx="3108960" cy="54864"/>
+          </a:xfrm>
+          <a:prstGeom prst="rect">
+            <a:avLst/>
+          </a:prstGeom>
+          <a:solidFill>
+            <a:srgbClr val="D62728"/>
+          </a:solidFill>
+          <a:ln/>
+        </p:spPr>
+      </p:sp>
+      <p:sp>
+        <p:nvSpPr>
+          <p:cNvPr id="15" name="Text 12"/>
+          <p:cNvSpPr/>
+          <p:nvPr/>
+        </p:nvSpPr>
+        <p:spPr>
+          <a:xfrm>
+            <a:off x="8503920" y="4251960"/>
+            <a:ext cx="3108960" cy="594360"/>
+          </a:xfrm>
+          <a:prstGeom prst="rect">
+            <a:avLst/>
+          </a:prstGeom>
+          <a:noFill/>
+          <a:ln/>
+        </p:spPr>
+        <p:txBody>
+          <a:bodyPr wrap="square" rtlCol="0" anchor="ctr"/>
+          <a:lstStyle/>
+          <a:p>
+            <a:pPr algn="ctr" indent="0" marL="0">
+              <a:buNone/>
+            </a:pPr>
+            <a:r>
+              <a:rPr lang="en-US" sz="3600" b="1" dirty="0">
+                <a:solidFill>
+                  <a:srgbClr val="D62728"/>
+                </a:solidFill>
+                <a:latin typeface="Consolas" pitchFamily="34" charset="0"/>
+                <a:ea typeface="Consolas" pitchFamily="34" charset="-122"/>
+                <a:cs typeface="Consolas" pitchFamily="34" charset="-120"/>
+              </a:rPr>
+              <a:t>~$19</a:t>
+            </a:r>
+            <a:endParaRPr lang="en-US" sz="3600" dirty="0"/>
+          </a:p>
+        </p:txBody>
+      </p:sp>
+      <p:sp>
+        <p:nvSpPr>
+          <p:cNvPr id="16" name="Text 13"/>
+          <p:cNvSpPr/>
+          <p:nvPr/>
+        </p:nvSpPr>
+        <p:spPr>
+          <a:xfrm>
+            <a:off x="8595360" y="4709160"/>
+            <a:ext cx="2926080" cy="475488"/>
+          </a:xfrm>
+          <a:prstGeom prst="rect">
+            <a:avLst/>
+          </a:prstGeom>
+          <a:noFill/>
+          <a:ln/>
+        </p:spPr>
+        <p:txBody>
+          <a:bodyPr wrap="square" rtlCol="0" anchor="t"/>
+          <a:lstStyle/>
+          <a:p>
+            <a:pPr algn="ctr" indent="0" marL="0">
+              <a:buNone/>
+            </a:pPr>
+            <a:r>
+              <a:rPr lang="en-US" sz="1300" dirty="0">
+                <a:solidFill>
+                  <a:srgbClr val="64748B"/>
+                </a:solidFill>
+                <a:latin typeface="Calibri" pitchFamily="34" charset="0"/>
+                <a:ea typeface="Calibri" pitchFamily="34" charset="-122"/>
+                <a:cs typeface="Calibri" pitchFamily="34" charset="-120"/>
+              </a:rPr>
+              <a:t>Qwen3-8B</a:t>
+            </a:r>
+            <a:endParaRPr lang="en-US" sz="1300" dirty="0"/>
+          </a:p>
+          <a:p>
+            <a:pPr algn="ctr" indent="0" marL="0">
+              <a:buNone/>
+            </a:pPr>
+            <a:r>
+              <a:rPr lang="en-US" sz="1300" dirty="0">
+                <a:solidFill>
+                  <a:srgbClr val="64748B"/>
+                </a:solidFill>
+                <a:latin typeface="Calibri" pitchFamily="34" charset="0"/>
+                <a:ea typeface="Calibri" pitchFamily="34" charset="-122"/>
+                <a:cs typeface="Calibri" pitchFamily="34" charset="-120"/>
+              </a:rPr>
+              <a:t>(всички опити)</a:t>
+            </a:r>
+            <a:endParaRPr lang="en-US" sz="1300" dirty="0"/>
+          </a:p>
+        </p:txBody>
+      </p:sp>
+      <p:sp>
+        <p:nvSpPr>
+          <p:cNvPr id="17" name="Text 14"/>
+          <p:cNvSpPr/>
+          <p:nvPr/>
+        </p:nvSpPr>
+        <p:spPr>
+          <a:xfrm>
+            <a:off x="0" y="6217920"/>
+            <a:ext cx="12191695" cy="320040"/>
+          </a:xfrm>
+          <a:prstGeom prst="rect">
+            <a:avLst/>
+          </a:prstGeom>
+          <a:noFill/>
+          <a:ln/>
+        </p:spPr>
+        <p:txBody>
+          <a:bodyPr wrap="square" rtlCol="0" anchor="ctr"/>
+          <a:lstStyle/>
+          <a:p>
+            <a:pPr algn="ctr" indent="0" marL="0">
+              <a:buNone/>
+            </a:pPr>
+            <a:r>
+              <a:rPr lang="en-US" sz="1200" i="1" dirty="0">
+                <a:solidFill>
+                  <a:srgbClr val="1E293B"/>
+                </a:solidFill>
+                <a:latin typeface="Calibri" pitchFamily="34" charset="0"/>
+                <a:ea typeface="Calibri" pitchFamily="34" charset="-122"/>
+                <a:cs typeface="Calibri" pitchFamily="34" charset="-120"/>
+              </a:rPr>
+              <a:t>Classic ML е едновременно най-евтин и най-точен за 13-лейбъл задачата</a:t>
+            </a:r>
+            <a:endParaRPr lang="en-US" sz="1200" dirty="0"/>
+          </a:p>
+        </p:txBody>
+      </p:sp>
+      <p:sp>
+        <p:nvSpPr>
+          <p:cNvPr id="18" name="Text 15"/>
           <p:cNvSpPr/>
           <p:nvPr/>
         </p:nvSpPr>
@@ -10583,7 +9597,7 @@
                 <a:ea typeface="Calibri" pitchFamily="34" charset="-122"/>
                 <a:cs typeface="Calibri" pitchFamily="34" charset="-120"/>
               </a:rPr>
-              <a:t>9 / 13</a:t>
+              <a:t>9 / 12</a:t>
             </a:r>
             <a:endParaRPr lang="en-US" sz="1000" dirty="0"/>
           </a:p>

</xml_diff>